<commit_message>
added event slides and xaringanExtra
</commit_message>
<xml_diff>
--- a/docs/images/slide-images.pptx
+++ b/docs/images/slide-images.pptx
@@ -9,6 +9,9 @@
     <p:sldId id="258" r:id="rId3"/>
     <p:sldId id="260" r:id="rId4"/>
     <p:sldId id="259" r:id="rId5"/>
+    <p:sldId id="263" r:id="rId6"/>
+    <p:sldId id="261" r:id="rId7"/>
+    <p:sldId id="262" r:id="rId8"/>
   </p:sldIdLst>
   <p:sldSz cx="12192000" cy="6858000"/>
   <p:notesSz cx="6858000" cy="9144000"/>
@@ -262,7 +265,7 @@
           <a:p>
             <a:fld id="{25CD4D0C-3F69-4524-99ED-CD9560AA544B}" type="datetimeFigureOut">
               <a:rPr lang="en-US" smtClean="0"/>
-              <a:t>2/23/2021</a:t>
+              <a:t>2/25/2021</a:t>
             </a:fld>
             <a:endParaRPr lang="en-US"/>
           </a:p>
@@ -460,7 +463,7 @@
           <a:p>
             <a:fld id="{25CD4D0C-3F69-4524-99ED-CD9560AA544B}" type="datetimeFigureOut">
               <a:rPr lang="en-US" smtClean="0"/>
-              <a:t>2/23/2021</a:t>
+              <a:t>2/25/2021</a:t>
             </a:fld>
             <a:endParaRPr lang="en-US"/>
           </a:p>
@@ -668,7 +671,7 @@
           <a:p>
             <a:fld id="{25CD4D0C-3F69-4524-99ED-CD9560AA544B}" type="datetimeFigureOut">
               <a:rPr lang="en-US" smtClean="0"/>
-              <a:t>2/23/2021</a:t>
+              <a:t>2/25/2021</a:t>
             </a:fld>
             <a:endParaRPr lang="en-US"/>
           </a:p>
@@ -866,7 +869,7 @@
           <a:p>
             <a:fld id="{25CD4D0C-3F69-4524-99ED-CD9560AA544B}" type="datetimeFigureOut">
               <a:rPr lang="en-US" smtClean="0"/>
-              <a:t>2/23/2021</a:t>
+              <a:t>2/25/2021</a:t>
             </a:fld>
             <a:endParaRPr lang="en-US"/>
           </a:p>
@@ -1141,7 +1144,7 @@
           <a:p>
             <a:fld id="{25CD4D0C-3F69-4524-99ED-CD9560AA544B}" type="datetimeFigureOut">
               <a:rPr lang="en-US" smtClean="0"/>
-              <a:t>2/23/2021</a:t>
+              <a:t>2/25/2021</a:t>
             </a:fld>
             <a:endParaRPr lang="en-US"/>
           </a:p>
@@ -1406,7 +1409,7 @@
           <a:p>
             <a:fld id="{25CD4D0C-3F69-4524-99ED-CD9560AA544B}" type="datetimeFigureOut">
               <a:rPr lang="en-US" smtClean="0"/>
-              <a:t>2/23/2021</a:t>
+              <a:t>2/25/2021</a:t>
             </a:fld>
             <a:endParaRPr lang="en-US"/>
           </a:p>
@@ -1818,7 +1821,7 @@
           <a:p>
             <a:fld id="{25CD4D0C-3F69-4524-99ED-CD9560AA544B}" type="datetimeFigureOut">
               <a:rPr lang="en-US" smtClean="0"/>
-              <a:t>2/23/2021</a:t>
+              <a:t>2/25/2021</a:t>
             </a:fld>
             <a:endParaRPr lang="en-US"/>
           </a:p>
@@ -1959,7 +1962,7 @@
           <a:p>
             <a:fld id="{25CD4D0C-3F69-4524-99ED-CD9560AA544B}" type="datetimeFigureOut">
               <a:rPr lang="en-US" smtClean="0"/>
-              <a:t>2/23/2021</a:t>
+              <a:t>2/25/2021</a:t>
             </a:fld>
             <a:endParaRPr lang="en-US"/>
           </a:p>
@@ -2072,7 +2075,7 @@
           <a:p>
             <a:fld id="{25CD4D0C-3F69-4524-99ED-CD9560AA544B}" type="datetimeFigureOut">
               <a:rPr lang="en-US" smtClean="0"/>
-              <a:t>2/23/2021</a:t>
+              <a:t>2/25/2021</a:t>
             </a:fld>
             <a:endParaRPr lang="en-US"/>
           </a:p>
@@ -2383,7 +2386,7 @@
           <a:p>
             <a:fld id="{25CD4D0C-3F69-4524-99ED-CD9560AA544B}" type="datetimeFigureOut">
               <a:rPr lang="en-US" smtClean="0"/>
-              <a:t>2/23/2021</a:t>
+              <a:t>2/25/2021</a:t>
             </a:fld>
             <a:endParaRPr lang="en-US"/>
           </a:p>
@@ -2671,7 +2674,7 @@
           <a:p>
             <a:fld id="{25CD4D0C-3F69-4524-99ED-CD9560AA544B}" type="datetimeFigureOut">
               <a:rPr lang="en-US" smtClean="0"/>
-              <a:t>2/23/2021</a:t>
+              <a:t>2/25/2021</a:t>
             </a:fld>
             <a:endParaRPr lang="en-US"/>
           </a:p>
@@ -2912,7 +2915,7 @@
           <a:p>
             <a:fld id="{25CD4D0C-3F69-4524-99ED-CD9560AA544B}" type="datetimeFigureOut">
               <a:rPr lang="en-US" smtClean="0"/>
-              <a:t>2/23/2021</a:t>
+              <a:t>2/25/2021</a:t>
             </a:fld>
             <a:endParaRPr lang="en-US"/>
           </a:p>
@@ -3883,6 +3886,547 @@
 </p:sld>
 </file>
 
+<file path=ppt/slides/slide5.xml><?xml version="1.0" encoding="utf-8"?>
+<p:sld xmlns:a="http://schemas.openxmlformats.org/drawingml/2006/main" xmlns:r="http://schemas.openxmlformats.org/officeDocument/2006/relationships" xmlns:p="http://schemas.openxmlformats.org/presentationml/2006/main">
+  <p:cSld>
+    <p:bg>
+      <p:bgPr>
+        <a:solidFill>
+          <a:schemeClr val="bg1"/>
+        </a:solidFill>
+        <a:effectLst/>
+      </p:bgPr>
+    </p:bg>
+    <p:spTree>
+      <p:nvGrpSpPr>
+        <p:cNvPr id="1" name=""/>
+        <p:cNvGrpSpPr/>
+        <p:nvPr/>
+      </p:nvGrpSpPr>
+      <p:grpSpPr>
+        <a:xfrm>
+          <a:off x="0" y="0"/>
+          <a:ext cx="0" cy="0"/>
+          <a:chOff x="0" y="0"/>
+          <a:chExt cx="0" cy="0"/>
+        </a:xfrm>
+      </p:grpSpPr>
+      <p:pic>
+        <p:nvPicPr>
+          <p:cNvPr id="3" name="Picture 2">
+            <a:extLst>
+              <a:ext uri="{FF2B5EF4-FFF2-40B4-BE49-F238E27FC236}">
+                <a16:creationId xmlns:a16="http://schemas.microsoft.com/office/drawing/2014/main" id="{0747A64E-D15C-43D0-B4C4-8A2644576285}"/>
+              </a:ext>
+            </a:extLst>
+          </p:cNvPr>
+          <p:cNvPicPr>
+            <a:picLocks noChangeAspect="1"/>
+          </p:cNvPicPr>
+          <p:nvPr/>
+        </p:nvPicPr>
+        <p:blipFill>
+          <a:blip r:embed="rId2"/>
+          <a:stretch>
+            <a:fillRect/>
+          </a:stretch>
+        </p:blipFill>
+        <p:spPr>
+          <a:xfrm>
+            <a:off x="643467" y="1179830"/>
+            <a:ext cx="10905066" cy="4498338"/>
+          </a:xfrm>
+          <a:prstGeom prst="rect">
+            <a:avLst/>
+          </a:prstGeom>
+        </p:spPr>
+      </p:pic>
+      <p:sp>
+        <p:nvSpPr>
+          <p:cNvPr id="4" name="Rectangle 3">
+            <a:extLst>
+              <a:ext uri="{FF2B5EF4-FFF2-40B4-BE49-F238E27FC236}">
+                <a16:creationId xmlns:a16="http://schemas.microsoft.com/office/drawing/2014/main" id="{DECA4EA2-FA37-4B82-BC4E-439AC3591EC2}"/>
+              </a:ext>
+            </a:extLst>
+          </p:cNvPr>
+          <p:cNvSpPr/>
+          <p:nvPr/>
+        </p:nvSpPr>
+        <p:spPr>
+          <a:xfrm>
+            <a:off x="494522" y="3275044"/>
+            <a:ext cx="2186473" cy="2276669"/>
+          </a:xfrm>
+          <a:prstGeom prst="rect">
+            <a:avLst/>
+          </a:prstGeom>
+          <a:noFill/>
+          <a:ln w="50800">
+            <a:solidFill>
+              <a:schemeClr val="accent4">
+                <a:lumMod val="60000"/>
+                <a:lumOff val="40000"/>
+              </a:schemeClr>
+            </a:solidFill>
+            <a:prstDash val="sysDash"/>
+          </a:ln>
+        </p:spPr>
+        <p:style>
+          <a:lnRef idx="2">
+            <a:schemeClr val="accent1">
+              <a:shade val="50000"/>
+            </a:schemeClr>
+          </a:lnRef>
+          <a:fillRef idx="1">
+            <a:schemeClr val="accent1"/>
+          </a:fillRef>
+          <a:effectRef idx="0">
+            <a:schemeClr val="accent1"/>
+          </a:effectRef>
+          <a:fontRef idx="minor">
+            <a:schemeClr val="lt1"/>
+          </a:fontRef>
+        </p:style>
+        <p:txBody>
+          <a:bodyPr rtlCol="0" anchor="ctr"/>
+          <a:lstStyle/>
+          <a:p>
+            <a:pPr algn="ctr"/>
+            <a:endParaRPr lang="en-US">
+              <a:noFill/>
+            </a:endParaRPr>
+          </a:p>
+        </p:txBody>
+      </p:sp>
+      <p:sp>
+        <p:nvSpPr>
+          <p:cNvPr id="5" name="Rectangle 4">
+            <a:extLst>
+              <a:ext uri="{FF2B5EF4-FFF2-40B4-BE49-F238E27FC236}">
+                <a16:creationId xmlns:a16="http://schemas.microsoft.com/office/drawing/2014/main" id="{0103C118-605B-490C-A702-5694237C3EF9}"/>
+              </a:ext>
+            </a:extLst>
+          </p:cNvPr>
+          <p:cNvSpPr/>
+          <p:nvPr/>
+        </p:nvSpPr>
+        <p:spPr>
+          <a:xfrm>
+            <a:off x="8979158" y="3275044"/>
+            <a:ext cx="2569375" cy="2052735"/>
+          </a:xfrm>
+          <a:prstGeom prst="rect">
+            <a:avLst/>
+          </a:prstGeom>
+          <a:noFill/>
+          <a:ln w="50800">
+            <a:solidFill>
+              <a:schemeClr val="accent4">
+                <a:lumMod val="60000"/>
+                <a:lumOff val="40000"/>
+              </a:schemeClr>
+            </a:solidFill>
+            <a:prstDash val="sysDash"/>
+          </a:ln>
+        </p:spPr>
+        <p:style>
+          <a:lnRef idx="2">
+            <a:schemeClr val="accent1">
+              <a:shade val="50000"/>
+            </a:schemeClr>
+          </a:lnRef>
+          <a:fillRef idx="1">
+            <a:schemeClr val="accent1"/>
+          </a:fillRef>
+          <a:effectRef idx="0">
+            <a:schemeClr val="accent1"/>
+          </a:effectRef>
+          <a:fontRef idx="minor">
+            <a:schemeClr val="lt1"/>
+          </a:fontRef>
+        </p:style>
+        <p:txBody>
+          <a:bodyPr rtlCol="0" anchor="ctr"/>
+          <a:lstStyle/>
+          <a:p>
+            <a:pPr algn="ctr"/>
+            <a:endParaRPr lang="en-US">
+              <a:noFill/>
+            </a:endParaRPr>
+          </a:p>
+        </p:txBody>
+      </p:sp>
+      <p:sp>
+        <p:nvSpPr>
+          <p:cNvPr id="6" name="Rectangle 5">
+            <a:extLst>
+              <a:ext uri="{FF2B5EF4-FFF2-40B4-BE49-F238E27FC236}">
+                <a16:creationId xmlns:a16="http://schemas.microsoft.com/office/drawing/2014/main" id="{B130E81F-6AF0-44E3-A57D-BA16FAEBB6D6}"/>
+              </a:ext>
+            </a:extLst>
+          </p:cNvPr>
+          <p:cNvSpPr/>
+          <p:nvPr/>
+        </p:nvSpPr>
+        <p:spPr>
+          <a:xfrm>
+            <a:off x="5952931" y="1250302"/>
+            <a:ext cx="1959428" cy="1184988"/>
+          </a:xfrm>
+          <a:prstGeom prst="rect">
+            <a:avLst/>
+          </a:prstGeom>
+          <a:noFill/>
+          <a:ln w="50800">
+            <a:solidFill>
+              <a:schemeClr val="accent2"/>
+            </a:solidFill>
+            <a:prstDash val="sysDash"/>
+          </a:ln>
+        </p:spPr>
+        <p:style>
+          <a:lnRef idx="2">
+            <a:schemeClr val="accent1">
+              <a:shade val="50000"/>
+            </a:schemeClr>
+          </a:lnRef>
+          <a:fillRef idx="1">
+            <a:schemeClr val="accent1"/>
+          </a:fillRef>
+          <a:effectRef idx="0">
+            <a:schemeClr val="accent1"/>
+          </a:effectRef>
+          <a:fontRef idx="minor">
+            <a:schemeClr val="lt1"/>
+          </a:fontRef>
+        </p:style>
+        <p:txBody>
+          <a:bodyPr rtlCol="0" anchor="ctr"/>
+          <a:lstStyle/>
+          <a:p>
+            <a:pPr algn="ctr"/>
+            <a:endParaRPr lang="en-US">
+              <a:noFill/>
+            </a:endParaRPr>
+          </a:p>
+        </p:txBody>
+      </p:sp>
+    </p:spTree>
+    <p:extLst>
+      <p:ext uri="{BB962C8B-B14F-4D97-AF65-F5344CB8AC3E}">
+        <p14:creationId xmlns:p14="http://schemas.microsoft.com/office/powerpoint/2010/main" val="3214791025"/>
+      </p:ext>
+    </p:extLst>
+  </p:cSld>
+  <p:clrMapOvr>
+    <a:masterClrMapping/>
+  </p:clrMapOvr>
+</p:sld>
+</file>
+
+<file path=ppt/slides/slide6.xml><?xml version="1.0" encoding="utf-8"?>
+<p:sld xmlns:a="http://schemas.openxmlformats.org/drawingml/2006/main" xmlns:r="http://schemas.openxmlformats.org/officeDocument/2006/relationships" xmlns:p="http://schemas.openxmlformats.org/presentationml/2006/main">
+  <p:cSld>
+    <p:bg>
+      <p:bgPr>
+        <a:solidFill>
+          <a:schemeClr val="bg1"/>
+        </a:solidFill>
+        <a:effectLst/>
+      </p:bgPr>
+    </p:bg>
+    <p:spTree>
+      <p:nvGrpSpPr>
+        <p:cNvPr id="1" name=""/>
+        <p:cNvGrpSpPr/>
+        <p:nvPr/>
+      </p:nvGrpSpPr>
+      <p:grpSpPr>
+        <a:xfrm>
+          <a:off x="0" y="0"/>
+          <a:ext cx="0" cy="0"/>
+          <a:chOff x="0" y="0"/>
+          <a:chExt cx="0" cy="0"/>
+        </a:xfrm>
+      </p:grpSpPr>
+      <p:pic>
+        <p:nvPicPr>
+          <p:cNvPr id="3" name="Picture 2" descr="Timeline&#10;&#10;Description automatically generated">
+            <a:extLst>
+              <a:ext uri="{FF2B5EF4-FFF2-40B4-BE49-F238E27FC236}">
+                <a16:creationId xmlns:a16="http://schemas.microsoft.com/office/drawing/2014/main" id="{C548E360-3F46-47D4-9155-5A9474A57175}"/>
+              </a:ext>
+            </a:extLst>
+          </p:cNvPr>
+          <p:cNvPicPr>
+            <a:picLocks noChangeAspect="1"/>
+          </p:cNvPicPr>
+          <p:nvPr/>
+        </p:nvPicPr>
+        <p:blipFill>
+          <a:blip r:embed="rId2"/>
+          <a:stretch>
+            <a:fillRect/>
+          </a:stretch>
+        </p:blipFill>
+        <p:spPr>
+          <a:xfrm>
+            <a:off x="643467" y="1179830"/>
+            <a:ext cx="10905066" cy="4498338"/>
+          </a:xfrm>
+          <a:prstGeom prst="rect">
+            <a:avLst/>
+          </a:prstGeom>
+        </p:spPr>
+      </p:pic>
+      <p:sp>
+        <p:nvSpPr>
+          <p:cNvPr id="4" name="Rectangle 3">
+            <a:extLst>
+              <a:ext uri="{FF2B5EF4-FFF2-40B4-BE49-F238E27FC236}">
+                <a16:creationId xmlns:a16="http://schemas.microsoft.com/office/drawing/2014/main" id="{B7614658-E7BD-4F6E-A1CD-93C8160AE3FA}"/>
+              </a:ext>
+            </a:extLst>
+          </p:cNvPr>
+          <p:cNvSpPr/>
+          <p:nvPr/>
+        </p:nvSpPr>
+        <p:spPr>
+          <a:xfrm>
+            <a:off x="6624735" y="4450702"/>
+            <a:ext cx="1959428" cy="1502229"/>
+          </a:xfrm>
+          <a:prstGeom prst="rect">
+            <a:avLst/>
+          </a:prstGeom>
+          <a:noFill/>
+          <a:ln w="50800">
+            <a:solidFill>
+              <a:schemeClr val="accent2"/>
+            </a:solidFill>
+            <a:prstDash val="sysDash"/>
+          </a:ln>
+        </p:spPr>
+        <p:style>
+          <a:lnRef idx="2">
+            <a:schemeClr val="accent1">
+              <a:shade val="50000"/>
+            </a:schemeClr>
+          </a:lnRef>
+          <a:fillRef idx="1">
+            <a:schemeClr val="accent1"/>
+          </a:fillRef>
+          <a:effectRef idx="0">
+            <a:schemeClr val="accent1"/>
+          </a:effectRef>
+          <a:fontRef idx="minor">
+            <a:schemeClr val="lt1"/>
+          </a:fontRef>
+        </p:style>
+        <p:txBody>
+          <a:bodyPr rtlCol="0" anchor="ctr"/>
+          <a:lstStyle/>
+          <a:p>
+            <a:pPr algn="ctr"/>
+            <a:endParaRPr lang="en-US">
+              <a:noFill/>
+            </a:endParaRPr>
+          </a:p>
+        </p:txBody>
+      </p:sp>
+      <p:sp>
+        <p:nvSpPr>
+          <p:cNvPr id="7" name="Rectangle 6">
+            <a:extLst>
+              <a:ext uri="{FF2B5EF4-FFF2-40B4-BE49-F238E27FC236}">
+                <a16:creationId xmlns:a16="http://schemas.microsoft.com/office/drawing/2014/main" id="{703F2FA3-600A-4360-A3C8-D958CC1D87F4}"/>
+              </a:ext>
+            </a:extLst>
+          </p:cNvPr>
+          <p:cNvSpPr/>
+          <p:nvPr/>
+        </p:nvSpPr>
+        <p:spPr>
+          <a:xfrm>
+            <a:off x="5984033" y="1278294"/>
+            <a:ext cx="1959428" cy="1129004"/>
+          </a:xfrm>
+          <a:prstGeom prst="rect">
+            <a:avLst/>
+          </a:prstGeom>
+          <a:noFill/>
+          <a:ln w="50800">
+            <a:solidFill>
+              <a:schemeClr val="accent4">
+                <a:lumMod val="60000"/>
+                <a:lumOff val="40000"/>
+              </a:schemeClr>
+            </a:solidFill>
+            <a:prstDash val="sysDash"/>
+          </a:ln>
+        </p:spPr>
+        <p:style>
+          <a:lnRef idx="2">
+            <a:schemeClr val="accent1">
+              <a:shade val="50000"/>
+            </a:schemeClr>
+          </a:lnRef>
+          <a:fillRef idx="1">
+            <a:schemeClr val="accent1"/>
+          </a:fillRef>
+          <a:effectRef idx="0">
+            <a:schemeClr val="accent1"/>
+          </a:effectRef>
+          <a:fontRef idx="minor">
+            <a:schemeClr val="lt1"/>
+          </a:fontRef>
+        </p:style>
+        <p:txBody>
+          <a:bodyPr rtlCol="0" anchor="ctr"/>
+          <a:lstStyle/>
+          <a:p>
+            <a:pPr algn="ctr"/>
+            <a:endParaRPr lang="en-US">
+              <a:noFill/>
+            </a:endParaRPr>
+          </a:p>
+        </p:txBody>
+      </p:sp>
+    </p:spTree>
+    <p:extLst>
+      <p:ext uri="{BB962C8B-B14F-4D97-AF65-F5344CB8AC3E}">
+        <p14:creationId xmlns:p14="http://schemas.microsoft.com/office/powerpoint/2010/main" val="2028907731"/>
+      </p:ext>
+    </p:extLst>
+  </p:cSld>
+  <p:clrMapOvr>
+    <a:masterClrMapping/>
+  </p:clrMapOvr>
+</p:sld>
+</file>
+
+<file path=ppt/slides/slide7.xml><?xml version="1.0" encoding="utf-8"?>
+<p:sld xmlns:a="http://schemas.openxmlformats.org/drawingml/2006/main" xmlns:r="http://schemas.openxmlformats.org/officeDocument/2006/relationships" xmlns:p="http://schemas.openxmlformats.org/presentationml/2006/main">
+  <p:cSld>
+    <p:bg>
+      <p:bgPr>
+        <a:solidFill>
+          <a:schemeClr val="bg1"/>
+        </a:solidFill>
+        <a:effectLst/>
+      </p:bgPr>
+    </p:bg>
+    <p:spTree>
+      <p:nvGrpSpPr>
+        <p:cNvPr id="1" name=""/>
+        <p:cNvGrpSpPr/>
+        <p:nvPr/>
+      </p:nvGrpSpPr>
+      <p:grpSpPr>
+        <a:xfrm>
+          <a:off x="0" y="0"/>
+          <a:ext cx="0" cy="0"/>
+          <a:chOff x="0" y="0"/>
+          <a:chExt cx="0" cy="0"/>
+        </a:xfrm>
+      </p:grpSpPr>
+      <p:pic>
+        <p:nvPicPr>
+          <p:cNvPr id="3" name="Picture 2">
+            <a:extLst>
+              <a:ext uri="{FF2B5EF4-FFF2-40B4-BE49-F238E27FC236}">
+                <a16:creationId xmlns:a16="http://schemas.microsoft.com/office/drawing/2014/main" id="{A5CFE66C-BA49-48A6-A5DA-0A268043B0BE}"/>
+              </a:ext>
+            </a:extLst>
+          </p:cNvPr>
+          <p:cNvPicPr>
+            <a:picLocks noChangeAspect="1"/>
+          </p:cNvPicPr>
+          <p:nvPr/>
+        </p:nvPicPr>
+        <p:blipFill>
+          <a:blip r:embed="rId2"/>
+          <a:stretch>
+            <a:fillRect/>
+          </a:stretch>
+        </p:blipFill>
+        <p:spPr>
+          <a:xfrm>
+            <a:off x="643467" y="1179830"/>
+            <a:ext cx="10905066" cy="4498338"/>
+          </a:xfrm>
+          <a:prstGeom prst="rect">
+            <a:avLst/>
+          </a:prstGeom>
+        </p:spPr>
+      </p:pic>
+      <p:sp>
+        <p:nvSpPr>
+          <p:cNvPr id="4" name="Rectangle 3">
+            <a:extLst>
+              <a:ext uri="{FF2B5EF4-FFF2-40B4-BE49-F238E27FC236}">
+                <a16:creationId xmlns:a16="http://schemas.microsoft.com/office/drawing/2014/main" id="{5A9AA260-7E29-4A63-ACFB-E6DA6E4460E4}"/>
+              </a:ext>
+            </a:extLst>
+          </p:cNvPr>
+          <p:cNvSpPr/>
+          <p:nvPr/>
+        </p:nvSpPr>
+        <p:spPr>
+          <a:xfrm>
+            <a:off x="1023457" y="1048624"/>
+            <a:ext cx="1775727" cy="1825205"/>
+          </a:xfrm>
+          <a:prstGeom prst="rect">
+            <a:avLst/>
+          </a:prstGeom>
+          <a:noFill/>
+          <a:ln w="47625">
+            <a:solidFill>
+              <a:schemeClr val="accent2"/>
+            </a:solidFill>
+            <a:prstDash val="sysDash"/>
+          </a:ln>
+        </p:spPr>
+        <p:style>
+          <a:lnRef idx="2">
+            <a:schemeClr val="accent1">
+              <a:shade val="50000"/>
+            </a:schemeClr>
+          </a:lnRef>
+          <a:fillRef idx="1">
+            <a:schemeClr val="accent1"/>
+          </a:fillRef>
+          <a:effectRef idx="0">
+            <a:schemeClr val="accent1"/>
+          </a:effectRef>
+          <a:fontRef idx="minor">
+            <a:schemeClr val="lt1"/>
+          </a:fontRef>
+        </p:style>
+        <p:txBody>
+          <a:bodyPr rtlCol="0" anchor="ctr"/>
+          <a:lstStyle/>
+          <a:p>
+            <a:pPr algn="ctr"/>
+            <a:endParaRPr lang="en-US"/>
+          </a:p>
+        </p:txBody>
+      </p:sp>
+    </p:spTree>
+    <p:extLst>
+      <p:ext uri="{BB962C8B-B14F-4D97-AF65-F5344CB8AC3E}">
+        <p14:creationId xmlns:p14="http://schemas.microsoft.com/office/powerpoint/2010/main" val="2200504443"/>
+      </p:ext>
+    </p:extLst>
+  </p:cSld>
+  <p:clrMapOvr>
+    <a:masterClrMapping/>
+  </p:clrMapOvr>
+</p:sld>
+</file>
+
 <file path=ppt/theme/theme1.xml><?xml version="1.0" encoding="utf-8"?>
 <a:theme xmlns:a="http://schemas.openxmlformats.org/drawingml/2006/main" name="Office Theme">
   <a:themeElements>

</xml_diff>

<commit_message>
added R framework slide
</commit_message>
<xml_diff>
--- a/docs/images/slide-images.pptx
+++ b/docs/images/slide-images.pptx
@@ -5,13 +5,14 @@
     <p:sldMasterId id="2147483648" r:id="rId1"/>
   </p:sldMasterIdLst>
   <p:sldIdLst>
-    <p:sldId id="256" r:id="rId2"/>
-    <p:sldId id="258" r:id="rId3"/>
-    <p:sldId id="260" r:id="rId4"/>
-    <p:sldId id="259" r:id="rId5"/>
-    <p:sldId id="263" r:id="rId6"/>
-    <p:sldId id="261" r:id="rId7"/>
-    <p:sldId id="262" r:id="rId8"/>
+    <p:sldId id="267" r:id="rId2"/>
+    <p:sldId id="256" r:id="rId3"/>
+    <p:sldId id="258" r:id="rId4"/>
+    <p:sldId id="260" r:id="rId5"/>
+    <p:sldId id="259" r:id="rId6"/>
+    <p:sldId id="263" r:id="rId7"/>
+    <p:sldId id="261" r:id="rId8"/>
+    <p:sldId id="262" r:id="rId9"/>
   </p:sldIdLst>
   <p:sldSz cx="12192000" cy="6858000"/>
   <p:notesSz cx="6858000" cy="9144000"/>
@@ -265,7 +266,7 @@
           <a:p>
             <a:fld id="{25CD4D0C-3F69-4524-99ED-CD9560AA544B}" type="datetimeFigureOut">
               <a:rPr lang="en-US" smtClean="0"/>
-              <a:t>2/25/2021</a:t>
+              <a:t>3/12/2021</a:t>
             </a:fld>
             <a:endParaRPr lang="en-US"/>
           </a:p>
@@ -463,7 +464,7 @@
           <a:p>
             <a:fld id="{25CD4D0C-3F69-4524-99ED-CD9560AA544B}" type="datetimeFigureOut">
               <a:rPr lang="en-US" smtClean="0"/>
-              <a:t>2/25/2021</a:t>
+              <a:t>3/12/2021</a:t>
             </a:fld>
             <a:endParaRPr lang="en-US"/>
           </a:p>
@@ -671,7 +672,7 @@
           <a:p>
             <a:fld id="{25CD4D0C-3F69-4524-99ED-CD9560AA544B}" type="datetimeFigureOut">
               <a:rPr lang="en-US" smtClean="0"/>
-              <a:t>2/25/2021</a:t>
+              <a:t>3/12/2021</a:t>
             </a:fld>
             <a:endParaRPr lang="en-US"/>
           </a:p>
@@ -869,7 +870,7 @@
           <a:p>
             <a:fld id="{25CD4D0C-3F69-4524-99ED-CD9560AA544B}" type="datetimeFigureOut">
               <a:rPr lang="en-US" smtClean="0"/>
-              <a:t>2/25/2021</a:t>
+              <a:t>3/12/2021</a:t>
             </a:fld>
             <a:endParaRPr lang="en-US"/>
           </a:p>
@@ -1144,7 +1145,7 @@
           <a:p>
             <a:fld id="{25CD4D0C-3F69-4524-99ED-CD9560AA544B}" type="datetimeFigureOut">
               <a:rPr lang="en-US" smtClean="0"/>
-              <a:t>2/25/2021</a:t>
+              <a:t>3/12/2021</a:t>
             </a:fld>
             <a:endParaRPr lang="en-US"/>
           </a:p>
@@ -1409,7 +1410,7 @@
           <a:p>
             <a:fld id="{25CD4D0C-3F69-4524-99ED-CD9560AA544B}" type="datetimeFigureOut">
               <a:rPr lang="en-US" smtClean="0"/>
-              <a:t>2/25/2021</a:t>
+              <a:t>3/12/2021</a:t>
             </a:fld>
             <a:endParaRPr lang="en-US"/>
           </a:p>
@@ -1821,7 +1822,7 @@
           <a:p>
             <a:fld id="{25CD4D0C-3F69-4524-99ED-CD9560AA544B}" type="datetimeFigureOut">
               <a:rPr lang="en-US" smtClean="0"/>
-              <a:t>2/25/2021</a:t>
+              <a:t>3/12/2021</a:t>
             </a:fld>
             <a:endParaRPr lang="en-US"/>
           </a:p>
@@ -1962,7 +1963,7 @@
           <a:p>
             <a:fld id="{25CD4D0C-3F69-4524-99ED-CD9560AA544B}" type="datetimeFigureOut">
               <a:rPr lang="en-US" smtClean="0"/>
-              <a:t>2/25/2021</a:t>
+              <a:t>3/12/2021</a:t>
             </a:fld>
             <a:endParaRPr lang="en-US"/>
           </a:p>
@@ -2075,7 +2076,7 @@
           <a:p>
             <a:fld id="{25CD4D0C-3F69-4524-99ED-CD9560AA544B}" type="datetimeFigureOut">
               <a:rPr lang="en-US" smtClean="0"/>
-              <a:t>2/25/2021</a:t>
+              <a:t>3/12/2021</a:t>
             </a:fld>
             <a:endParaRPr lang="en-US"/>
           </a:p>
@@ -2386,7 +2387,7 @@
           <a:p>
             <a:fld id="{25CD4D0C-3F69-4524-99ED-CD9560AA544B}" type="datetimeFigureOut">
               <a:rPr lang="en-US" smtClean="0"/>
-              <a:t>2/25/2021</a:t>
+              <a:t>3/12/2021</a:t>
             </a:fld>
             <a:endParaRPr lang="en-US"/>
           </a:p>
@@ -2674,7 +2675,7 @@
           <a:p>
             <a:fld id="{25CD4D0C-3F69-4524-99ED-CD9560AA544B}" type="datetimeFigureOut">
               <a:rPr lang="en-US" smtClean="0"/>
-              <a:t>2/25/2021</a:t>
+              <a:t>3/12/2021</a:t>
             </a:fld>
             <a:endParaRPr lang="en-US"/>
           </a:p>
@@ -2915,7 +2916,7 @@
           <a:p>
             <a:fld id="{25CD4D0C-3F69-4524-99ED-CD9560AA544B}" type="datetimeFigureOut">
               <a:rPr lang="en-US" smtClean="0"/>
-              <a:t>2/25/2021</a:t>
+              <a:t>3/12/2021</a:t>
             </a:fld>
             <a:endParaRPr lang="en-US"/>
           </a:p>
@@ -3332,6 +3333,617 @@
           <a:chExt cx="0" cy="0"/>
         </a:xfrm>
       </p:grpSpPr>
+      <p:pic>
+        <p:nvPicPr>
+          <p:cNvPr id="2" name="Picture 1">
+            <a:extLst>
+              <a:ext uri="{FF2B5EF4-FFF2-40B4-BE49-F238E27FC236}">
+                <a16:creationId xmlns:a16="http://schemas.microsoft.com/office/drawing/2014/main" id="{2CD4F1F0-BF28-43EE-BA2B-DCF50DF15012}"/>
+              </a:ext>
+            </a:extLst>
+          </p:cNvPr>
+          <p:cNvPicPr>
+            <a:picLocks noChangeAspect="1"/>
+          </p:cNvPicPr>
+          <p:nvPr/>
+        </p:nvPicPr>
+        <p:blipFill>
+          <a:blip r:embed="rId2">
+            <a:extLst>
+              <a:ext uri="{28A0092B-C50C-407E-A947-70E740481C1C}">
+                <a14:useLocalDpi xmlns:a14="http://schemas.microsoft.com/office/drawing/2010/main" val="0"/>
+              </a:ext>
+            </a:extLst>
+          </a:blip>
+          <a:stretch>
+            <a:fillRect/>
+          </a:stretch>
+        </p:blipFill>
+        <p:spPr>
+          <a:xfrm>
+            <a:off x="8832141" y="4492555"/>
+            <a:ext cx="1090134" cy="1090132"/>
+          </a:xfrm>
+          <a:prstGeom prst="rect">
+            <a:avLst/>
+          </a:prstGeom>
+        </p:spPr>
+      </p:pic>
+      <p:pic>
+        <p:nvPicPr>
+          <p:cNvPr id="3" name="Picture 2" descr="A picture containing text, businesscard, sign, vector graphics&#10;&#10;Description automatically generated">
+            <a:extLst>
+              <a:ext uri="{FF2B5EF4-FFF2-40B4-BE49-F238E27FC236}">
+                <a16:creationId xmlns:a16="http://schemas.microsoft.com/office/drawing/2014/main" id="{4C0C776A-3375-4C86-83FA-7CA89C7761F0}"/>
+              </a:ext>
+            </a:extLst>
+          </p:cNvPr>
+          <p:cNvPicPr>
+            <a:picLocks noChangeAspect="1"/>
+          </p:cNvPicPr>
+          <p:nvPr/>
+        </p:nvPicPr>
+        <p:blipFill>
+          <a:blip r:embed="rId3">
+            <a:extLst>
+              <a:ext uri="{28A0092B-C50C-407E-A947-70E740481C1C}">
+                <a14:useLocalDpi xmlns:a14="http://schemas.microsoft.com/office/drawing/2010/main" val="0"/>
+              </a:ext>
+            </a:extLst>
+          </a:blip>
+          <a:stretch>
+            <a:fillRect/>
+          </a:stretch>
+        </p:blipFill>
+        <p:spPr>
+          <a:xfrm>
+            <a:off x="1750832" y="3347562"/>
+            <a:ext cx="1301842" cy="1509381"/>
+          </a:xfrm>
+          <a:prstGeom prst="rect">
+            <a:avLst/>
+          </a:prstGeom>
+        </p:spPr>
+      </p:pic>
+      <p:pic>
+        <p:nvPicPr>
+          <p:cNvPr id="4" name="Picture 3">
+            <a:extLst>
+              <a:ext uri="{FF2B5EF4-FFF2-40B4-BE49-F238E27FC236}">
+                <a16:creationId xmlns:a16="http://schemas.microsoft.com/office/drawing/2014/main" id="{7882C8AA-B761-4B46-96D4-DC7D7C016B2A}"/>
+              </a:ext>
+            </a:extLst>
+          </p:cNvPr>
+          <p:cNvPicPr>
+            <a:picLocks noChangeAspect="1"/>
+          </p:cNvPicPr>
+          <p:nvPr/>
+        </p:nvPicPr>
+        <p:blipFill>
+          <a:blip r:embed="rId4"/>
+          <a:stretch>
+            <a:fillRect/>
+          </a:stretch>
+        </p:blipFill>
+        <p:spPr>
+          <a:xfrm>
+            <a:off x="4536731" y="1024833"/>
+            <a:ext cx="2706938" cy="947428"/>
+          </a:xfrm>
+          <a:prstGeom prst="rect">
+            <a:avLst/>
+          </a:prstGeom>
+        </p:spPr>
+      </p:pic>
+      <p:pic>
+        <p:nvPicPr>
+          <p:cNvPr id="6" name="Graphic 5">
+            <a:extLst>
+              <a:ext uri="{FF2B5EF4-FFF2-40B4-BE49-F238E27FC236}">
+                <a16:creationId xmlns:a16="http://schemas.microsoft.com/office/drawing/2014/main" id="{2A239D25-8EC9-4B76-92F7-478C81C2CD95}"/>
+              </a:ext>
+            </a:extLst>
+          </p:cNvPr>
+          <p:cNvPicPr>
+            <a:picLocks noChangeAspect="1"/>
+          </p:cNvPicPr>
+          <p:nvPr/>
+        </p:nvPicPr>
+        <p:blipFill>
+          <a:blip r:embed="rId5">
+            <a:extLst>
+              <a:ext uri="{28A0092B-C50C-407E-A947-70E740481C1C}">
+                <a14:useLocalDpi xmlns:a14="http://schemas.microsoft.com/office/drawing/2010/main" val="0"/>
+              </a:ext>
+              <a:ext uri="{96DAC541-7B7A-43D3-8B79-37D633B846F1}">
+                <asvg:svgBlip xmlns:asvg="http://schemas.microsoft.com/office/drawing/2016/SVG/main" r:embed="rId6"/>
+              </a:ext>
+            </a:extLst>
+          </a:blip>
+          <a:stretch>
+            <a:fillRect/>
+          </a:stretch>
+        </p:blipFill>
+        <p:spPr>
+          <a:xfrm>
+            <a:off x="1459126" y="851481"/>
+            <a:ext cx="1211340" cy="938620"/>
+          </a:xfrm>
+          <a:prstGeom prst="rect">
+            <a:avLst/>
+          </a:prstGeom>
+        </p:spPr>
+      </p:pic>
+      <p:pic>
+        <p:nvPicPr>
+          <p:cNvPr id="7" name="Picture 6">
+            <a:extLst>
+              <a:ext uri="{FF2B5EF4-FFF2-40B4-BE49-F238E27FC236}">
+                <a16:creationId xmlns:a16="http://schemas.microsoft.com/office/drawing/2014/main" id="{9AA17C21-20CB-4651-AE0B-6DBAD60B902D}"/>
+              </a:ext>
+            </a:extLst>
+          </p:cNvPr>
+          <p:cNvPicPr>
+            <a:picLocks noChangeAspect="1"/>
+          </p:cNvPicPr>
+          <p:nvPr/>
+        </p:nvPicPr>
+        <p:blipFill>
+          <a:blip r:embed="rId7"/>
+          <a:stretch>
+            <a:fillRect/>
+          </a:stretch>
+        </p:blipFill>
+        <p:spPr>
+          <a:xfrm>
+            <a:off x="4724182" y="3638754"/>
+            <a:ext cx="1733318" cy="581770"/>
+          </a:xfrm>
+          <a:prstGeom prst="rect">
+            <a:avLst/>
+          </a:prstGeom>
+        </p:spPr>
+      </p:pic>
+      <p:cxnSp>
+        <p:nvCxnSpPr>
+          <p:cNvPr id="9" name="Straight Connector 8">
+            <a:extLst>
+              <a:ext uri="{FF2B5EF4-FFF2-40B4-BE49-F238E27FC236}">
+                <a16:creationId xmlns:a16="http://schemas.microsoft.com/office/drawing/2014/main" id="{9A315C86-14D6-4AE7-A6E5-C6AC6C0513FC}"/>
+              </a:ext>
+            </a:extLst>
+          </p:cNvPr>
+          <p:cNvCxnSpPr>
+            <a:cxnSpLocks/>
+          </p:cNvCxnSpPr>
+          <p:nvPr/>
+        </p:nvCxnSpPr>
+        <p:spPr>
+          <a:xfrm>
+            <a:off x="3737499" y="0"/>
+            <a:ext cx="0" cy="6858000"/>
+          </a:xfrm>
+          <a:prstGeom prst="line">
+            <a:avLst/>
+          </a:prstGeom>
+        </p:spPr>
+        <p:style>
+          <a:lnRef idx="1">
+            <a:schemeClr val="accent3"/>
+          </a:lnRef>
+          <a:fillRef idx="0">
+            <a:schemeClr val="accent3"/>
+          </a:fillRef>
+          <a:effectRef idx="0">
+            <a:schemeClr val="accent3"/>
+          </a:effectRef>
+          <a:fontRef idx="minor">
+            <a:schemeClr val="tx1"/>
+          </a:fontRef>
+        </p:style>
+      </p:cxnSp>
+      <p:cxnSp>
+        <p:nvCxnSpPr>
+          <p:cNvPr id="13" name="Straight Connector 12">
+            <a:extLst>
+              <a:ext uri="{FF2B5EF4-FFF2-40B4-BE49-F238E27FC236}">
+                <a16:creationId xmlns:a16="http://schemas.microsoft.com/office/drawing/2014/main" id="{97807A5D-756F-4B75-8907-5DAC6D8BCCBC}"/>
+              </a:ext>
+            </a:extLst>
+          </p:cNvPr>
+          <p:cNvCxnSpPr>
+            <a:cxnSpLocks/>
+          </p:cNvCxnSpPr>
+          <p:nvPr/>
+        </p:nvCxnSpPr>
+        <p:spPr>
+          <a:xfrm>
+            <a:off x="8009137" y="0"/>
+            <a:ext cx="0" cy="6858000"/>
+          </a:xfrm>
+          <a:prstGeom prst="line">
+            <a:avLst/>
+          </a:prstGeom>
+        </p:spPr>
+        <p:style>
+          <a:lnRef idx="1">
+            <a:schemeClr val="accent3"/>
+          </a:lnRef>
+          <a:fillRef idx="0">
+            <a:schemeClr val="accent3"/>
+          </a:fillRef>
+          <a:effectRef idx="0">
+            <a:schemeClr val="accent3"/>
+          </a:effectRef>
+          <a:fontRef idx="minor">
+            <a:schemeClr val="tx1"/>
+          </a:fontRef>
+        </p:style>
+      </p:cxnSp>
+      <p:pic>
+        <p:nvPicPr>
+          <p:cNvPr id="19" name="Picture 18" descr="Icon&#10;&#10;Description automatically generated">
+            <a:extLst>
+              <a:ext uri="{FF2B5EF4-FFF2-40B4-BE49-F238E27FC236}">
+                <a16:creationId xmlns:a16="http://schemas.microsoft.com/office/drawing/2014/main" id="{15800E2E-44A0-40AA-A89F-2EF408108E03}"/>
+              </a:ext>
+            </a:extLst>
+          </p:cNvPr>
+          <p:cNvPicPr>
+            <a:picLocks noChangeAspect="1"/>
+          </p:cNvPicPr>
+          <p:nvPr/>
+        </p:nvPicPr>
+        <p:blipFill>
+          <a:blip r:embed="rId8">
+            <a:extLst>
+              <a:ext uri="{28A0092B-C50C-407E-A947-70E740481C1C}">
+                <a14:useLocalDpi xmlns:a14="http://schemas.microsoft.com/office/drawing/2010/main" val="0"/>
+              </a:ext>
+            </a:extLst>
+          </a:blip>
+          <a:stretch>
+            <a:fillRect/>
+          </a:stretch>
+        </p:blipFill>
+        <p:spPr>
+          <a:xfrm>
+            <a:off x="10274423" y="5037621"/>
+            <a:ext cx="1479612" cy="1046132"/>
+          </a:xfrm>
+          <a:prstGeom prst="rect">
+            <a:avLst/>
+          </a:prstGeom>
+        </p:spPr>
+      </p:pic>
+      <p:pic>
+        <p:nvPicPr>
+          <p:cNvPr id="21" name="Picture 20" descr="A picture containing shape&#10;&#10;Description automatically generated">
+            <a:extLst>
+              <a:ext uri="{FF2B5EF4-FFF2-40B4-BE49-F238E27FC236}">
+                <a16:creationId xmlns:a16="http://schemas.microsoft.com/office/drawing/2014/main" id="{1A542DA7-E583-47DA-BD18-08CE3EB17B9D}"/>
+              </a:ext>
+            </a:extLst>
+          </p:cNvPr>
+          <p:cNvPicPr>
+            <a:picLocks noChangeAspect="1"/>
+          </p:cNvPicPr>
+          <p:nvPr/>
+        </p:nvPicPr>
+        <p:blipFill>
+          <a:blip r:embed="rId9">
+            <a:extLst>
+              <a:ext uri="{28A0092B-C50C-407E-A947-70E740481C1C}">
+                <a14:useLocalDpi xmlns:a14="http://schemas.microsoft.com/office/drawing/2010/main" val="0"/>
+              </a:ext>
+            </a:extLst>
+          </a:blip>
+          <a:stretch>
+            <a:fillRect/>
+          </a:stretch>
+        </p:blipFill>
+        <p:spPr>
+          <a:xfrm>
+            <a:off x="10427434" y="3814511"/>
+            <a:ext cx="927698" cy="803582"/>
+          </a:xfrm>
+          <a:prstGeom prst="rect">
+            <a:avLst/>
+          </a:prstGeom>
+        </p:spPr>
+      </p:pic>
+      <p:pic>
+        <p:nvPicPr>
+          <p:cNvPr id="23" name="Picture 22" descr="Logo&#10;&#10;Description automatically generated">
+            <a:extLst>
+              <a:ext uri="{FF2B5EF4-FFF2-40B4-BE49-F238E27FC236}">
+                <a16:creationId xmlns:a16="http://schemas.microsoft.com/office/drawing/2014/main" id="{D0403223-E208-467E-8530-1E07F4174D28}"/>
+              </a:ext>
+            </a:extLst>
+          </p:cNvPr>
+          <p:cNvPicPr>
+            <a:picLocks noChangeAspect="1"/>
+          </p:cNvPicPr>
+          <p:nvPr/>
+        </p:nvPicPr>
+        <p:blipFill>
+          <a:blip r:embed="rId10">
+            <a:extLst>
+              <a:ext uri="{28A0092B-C50C-407E-A947-70E740481C1C}">
+                <a14:useLocalDpi xmlns:a14="http://schemas.microsoft.com/office/drawing/2010/main" val="0"/>
+              </a:ext>
+            </a:extLst>
+          </a:blip>
+          <a:stretch>
+            <a:fillRect/>
+          </a:stretch>
+        </p:blipFill>
+        <p:spPr>
+          <a:xfrm>
+            <a:off x="9481074" y="609093"/>
+            <a:ext cx="1181008" cy="1181008"/>
+          </a:xfrm>
+          <a:prstGeom prst="rect">
+            <a:avLst/>
+          </a:prstGeom>
+        </p:spPr>
+      </p:pic>
+      <p:pic>
+        <p:nvPicPr>
+          <p:cNvPr id="25" name="Picture 24">
+            <a:extLst>
+              <a:ext uri="{FF2B5EF4-FFF2-40B4-BE49-F238E27FC236}">
+                <a16:creationId xmlns:a16="http://schemas.microsoft.com/office/drawing/2014/main" id="{5EF832D7-5245-4FF9-BF16-C720BA8D05DF}"/>
+              </a:ext>
+            </a:extLst>
+          </p:cNvPr>
+          <p:cNvPicPr>
+            <a:picLocks noChangeAspect="1"/>
+          </p:cNvPicPr>
+          <p:nvPr/>
+        </p:nvPicPr>
+        <p:blipFill>
+          <a:blip r:embed="rId11"/>
+          <a:stretch>
+            <a:fillRect/>
+          </a:stretch>
+        </p:blipFill>
+        <p:spPr>
+          <a:xfrm>
+            <a:off x="8578887" y="3619874"/>
+            <a:ext cx="1409897" cy="466790"/>
+          </a:xfrm>
+          <a:prstGeom prst="rect">
+            <a:avLst/>
+          </a:prstGeom>
+        </p:spPr>
+      </p:pic>
+      <p:pic>
+        <p:nvPicPr>
+          <p:cNvPr id="27" name="Picture 26">
+            <a:extLst>
+              <a:ext uri="{FF2B5EF4-FFF2-40B4-BE49-F238E27FC236}">
+                <a16:creationId xmlns:a16="http://schemas.microsoft.com/office/drawing/2014/main" id="{1E23BFFB-481C-4EBC-9B1C-C4EE436B549A}"/>
+              </a:ext>
+            </a:extLst>
+          </p:cNvPr>
+          <p:cNvPicPr>
+            <a:picLocks noChangeAspect="1"/>
+          </p:cNvPicPr>
+          <p:nvPr/>
+        </p:nvPicPr>
+        <p:blipFill>
+          <a:blip r:embed="rId12"/>
+          <a:stretch>
+            <a:fillRect/>
+          </a:stretch>
+        </p:blipFill>
+        <p:spPr>
+          <a:xfrm>
+            <a:off x="4257594" y="4430692"/>
+            <a:ext cx="1347158" cy="729400"/>
+          </a:xfrm>
+          <a:prstGeom prst="rect">
+            <a:avLst/>
+          </a:prstGeom>
+        </p:spPr>
+      </p:pic>
+      <p:pic>
+        <p:nvPicPr>
+          <p:cNvPr id="29" name="Picture 28">
+            <a:extLst>
+              <a:ext uri="{FF2B5EF4-FFF2-40B4-BE49-F238E27FC236}">
+                <a16:creationId xmlns:a16="http://schemas.microsoft.com/office/drawing/2014/main" id="{BEA97807-8E0D-4816-962F-DE2BCFFB8BA8}"/>
+              </a:ext>
+            </a:extLst>
+          </p:cNvPr>
+          <p:cNvPicPr>
+            <a:picLocks noChangeAspect="1"/>
+          </p:cNvPicPr>
+          <p:nvPr/>
+        </p:nvPicPr>
+        <p:blipFill>
+          <a:blip r:embed="rId13"/>
+          <a:stretch>
+            <a:fillRect/>
+          </a:stretch>
+        </p:blipFill>
+        <p:spPr>
+          <a:xfrm>
+            <a:off x="6080616" y="5165437"/>
+            <a:ext cx="1468426" cy="487328"/>
+          </a:xfrm>
+          <a:prstGeom prst="rect">
+            <a:avLst/>
+          </a:prstGeom>
+        </p:spPr>
+      </p:pic>
+      <p:pic>
+        <p:nvPicPr>
+          <p:cNvPr id="31" name="Picture 30">
+            <a:extLst>
+              <a:ext uri="{FF2B5EF4-FFF2-40B4-BE49-F238E27FC236}">
+                <a16:creationId xmlns:a16="http://schemas.microsoft.com/office/drawing/2014/main" id="{0424931F-FCE1-4FD2-96B0-7CBFB8EE510E}"/>
+              </a:ext>
+            </a:extLst>
+          </p:cNvPr>
+          <p:cNvPicPr>
+            <a:picLocks noChangeAspect="1"/>
+          </p:cNvPicPr>
+          <p:nvPr/>
+        </p:nvPicPr>
+        <p:blipFill>
+          <a:blip r:embed="rId14"/>
+          <a:stretch>
+            <a:fillRect/>
+          </a:stretch>
+        </p:blipFill>
+        <p:spPr>
+          <a:xfrm>
+            <a:off x="6289571" y="4216302"/>
+            <a:ext cx="1273922" cy="528798"/>
+          </a:xfrm>
+          <a:prstGeom prst="rect">
+            <a:avLst/>
+          </a:prstGeom>
+        </p:spPr>
+      </p:pic>
+      <p:pic>
+        <p:nvPicPr>
+          <p:cNvPr id="32" name="Picture 31">
+            <a:extLst>
+              <a:ext uri="{FF2B5EF4-FFF2-40B4-BE49-F238E27FC236}">
+                <a16:creationId xmlns:a16="http://schemas.microsoft.com/office/drawing/2014/main" id="{96295D69-76AF-46BF-B944-5C79CA181DCB}"/>
+              </a:ext>
+            </a:extLst>
+          </p:cNvPr>
+          <p:cNvPicPr>
+            <a:picLocks noChangeAspect="1"/>
+          </p:cNvPicPr>
+          <p:nvPr/>
+        </p:nvPicPr>
+        <p:blipFill>
+          <a:blip r:embed="rId7"/>
+          <a:stretch>
+            <a:fillRect/>
+          </a:stretch>
+        </p:blipFill>
+        <p:spPr>
+          <a:xfrm>
+            <a:off x="721549" y="5279903"/>
+            <a:ext cx="1733318" cy="581770"/>
+          </a:xfrm>
+          <a:prstGeom prst="rect">
+            <a:avLst/>
+          </a:prstGeom>
+        </p:spPr>
+      </p:pic>
+      <p:sp>
+        <p:nvSpPr>
+          <p:cNvPr id="33" name="TextBox 32">
+            <a:extLst>
+              <a:ext uri="{FF2B5EF4-FFF2-40B4-BE49-F238E27FC236}">
+                <a16:creationId xmlns:a16="http://schemas.microsoft.com/office/drawing/2014/main" id="{4D4FF0C0-66F1-4F9D-A954-3281F6580BEE}"/>
+              </a:ext>
+            </a:extLst>
+          </p:cNvPr>
+          <p:cNvSpPr txBox="1"/>
+          <p:nvPr/>
+        </p:nvSpPr>
+        <p:spPr>
+          <a:xfrm>
+            <a:off x="4182864" y="6045871"/>
+            <a:ext cx="1748107" cy="338554"/>
+          </a:xfrm>
+          <a:prstGeom prst="rect">
+            <a:avLst/>
+          </a:prstGeom>
+          <a:noFill/>
+        </p:spPr>
+        <p:txBody>
+          <a:bodyPr wrap="none" rtlCol="0">
+            <a:spAutoFit/>
+          </a:bodyPr>
+          <a:lstStyle/>
+          <a:p>
+            <a:r>
+              <a:rPr lang="en-US" sz="1600" dirty="0">
+                <a:latin typeface="Segoe UI Semilight" panose="020B0402040204020203" pitchFamily="34" charset="0"/>
+                <a:cs typeface="Segoe UI Semilight" panose="020B0402040204020203" pitchFamily="34" charset="0"/>
+              </a:rPr>
+              <a:t>And many more…</a:t>
+            </a:r>
+          </a:p>
+        </p:txBody>
+      </p:sp>
+      <p:sp>
+        <p:nvSpPr>
+          <p:cNvPr id="34" name="TextBox 33">
+            <a:extLst>
+              <a:ext uri="{FF2B5EF4-FFF2-40B4-BE49-F238E27FC236}">
+                <a16:creationId xmlns:a16="http://schemas.microsoft.com/office/drawing/2014/main" id="{271DF343-DA16-4F9E-8A65-73C4CB670171}"/>
+              </a:ext>
+            </a:extLst>
+          </p:cNvPr>
+          <p:cNvSpPr txBox="1"/>
+          <p:nvPr/>
+        </p:nvSpPr>
+        <p:spPr>
+          <a:xfrm>
+            <a:off x="8469233" y="6043053"/>
+            <a:ext cx="1748107" cy="338554"/>
+          </a:xfrm>
+          <a:prstGeom prst="rect">
+            <a:avLst/>
+          </a:prstGeom>
+          <a:noFill/>
+        </p:spPr>
+        <p:txBody>
+          <a:bodyPr wrap="none" rtlCol="0">
+            <a:spAutoFit/>
+          </a:bodyPr>
+          <a:lstStyle/>
+          <a:p>
+            <a:r>
+              <a:rPr lang="en-US" sz="1600" dirty="0">
+                <a:latin typeface="Segoe UI Semilight" panose="020B0402040204020203" pitchFamily="34" charset="0"/>
+                <a:cs typeface="Segoe UI Semilight" panose="020B0402040204020203" pitchFamily="34" charset="0"/>
+              </a:rPr>
+              <a:t>And many more…</a:t>
+            </a:r>
+          </a:p>
+        </p:txBody>
+      </p:sp>
+    </p:spTree>
+    <p:extLst>
+      <p:ext uri="{BB962C8B-B14F-4D97-AF65-F5344CB8AC3E}">
+        <p14:creationId xmlns:p14="http://schemas.microsoft.com/office/powerpoint/2010/main" val="1888603336"/>
+      </p:ext>
+    </p:extLst>
+  </p:cSld>
+  <p:clrMapOvr>
+    <a:masterClrMapping/>
+  </p:clrMapOvr>
+</p:sld>
+</file>
+
+<file path=ppt/slides/slide2.xml><?xml version="1.0" encoding="utf-8"?>
+<p:sld xmlns:a="http://schemas.openxmlformats.org/drawingml/2006/main" xmlns:r="http://schemas.openxmlformats.org/officeDocument/2006/relationships" xmlns:p="http://schemas.openxmlformats.org/presentationml/2006/main">
+  <p:cSld>
+    <p:spTree>
+      <p:nvGrpSpPr>
+        <p:cNvPr id="1" name=""/>
+        <p:cNvGrpSpPr/>
+        <p:nvPr/>
+      </p:nvGrpSpPr>
+      <p:grpSpPr>
+        <a:xfrm>
+          <a:off x="0" y="0"/>
+          <a:ext cx="0" cy="0"/>
+          <a:chOff x="0" y="0"/>
+          <a:chExt cx="0" cy="0"/>
+        </a:xfrm>
+      </p:grpSpPr>
       <p:grpSp>
         <p:nvGrpSpPr>
           <p:cNvPr id="12" name="Group 11">
@@ -3526,7 +4138,7 @@
 </p:sld>
 </file>
 
-<file path=ppt/slides/slide2.xml><?xml version="1.0" encoding="utf-8"?>
+<file path=ppt/slides/slide3.xml><?xml version="1.0" encoding="utf-8"?>
 <p:sld xmlns:a="http://schemas.openxmlformats.org/drawingml/2006/main" xmlns:r="http://schemas.openxmlformats.org/officeDocument/2006/relationships" xmlns:p="http://schemas.openxmlformats.org/presentationml/2006/main">
   <p:cSld>
     <p:spTree>
@@ -3737,7 +4349,7 @@
 </p:sld>
 </file>
 
-<file path=ppt/slides/slide3.xml><?xml version="1.0" encoding="utf-8"?>
+<file path=ppt/slides/slide4.xml><?xml version="1.0" encoding="utf-8"?>
 <p:sld xmlns:a="http://schemas.openxmlformats.org/drawingml/2006/main" xmlns:r="http://schemas.openxmlformats.org/officeDocument/2006/relationships" xmlns:p="http://schemas.openxmlformats.org/presentationml/2006/main">
   <p:cSld>
     <p:spTree>
@@ -3826,7 +4438,7 @@
 </p:sld>
 </file>
 
-<file path=ppt/slides/slide4.xml><?xml version="1.0" encoding="utf-8"?>
+<file path=ppt/slides/slide5.xml><?xml version="1.0" encoding="utf-8"?>
 <p:sld xmlns:a="http://schemas.openxmlformats.org/drawingml/2006/main" xmlns:r="http://schemas.openxmlformats.org/officeDocument/2006/relationships" xmlns:p="http://schemas.openxmlformats.org/presentationml/2006/main">
   <p:cSld>
     <p:spTree>
@@ -3877,245 +4489,6 @@
     <p:extLst>
       <p:ext uri="{BB962C8B-B14F-4D97-AF65-F5344CB8AC3E}">
         <p14:creationId xmlns:p14="http://schemas.microsoft.com/office/powerpoint/2010/main" val="1532331343"/>
-      </p:ext>
-    </p:extLst>
-  </p:cSld>
-  <p:clrMapOvr>
-    <a:masterClrMapping/>
-  </p:clrMapOvr>
-</p:sld>
-</file>
-
-<file path=ppt/slides/slide5.xml><?xml version="1.0" encoding="utf-8"?>
-<p:sld xmlns:a="http://schemas.openxmlformats.org/drawingml/2006/main" xmlns:r="http://schemas.openxmlformats.org/officeDocument/2006/relationships" xmlns:p="http://schemas.openxmlformats.org/presentationml/2006/main">
-  <p:cSld>
-    <p:bg>
-      <p:bgPr>
-        <a:solidFill>
-          <a:schemeClr val="bg1"/>
-        </a:solidFill>
-        <a:effectLst/>
-      </p:bgPr>
-    </p:bg>
-    <p:spTree>
-      <p:nvGrpSpPr>
-        <p:cNvPr id="1" name=""/>
-        <p:cNvGrpSpPr/>
-        <p:nvPr/>
-      </p:nvGrpSpPr>
-      <p:grpSpPr>
-        <a:xfrm>
-          <a:off x="0" y="0"/>
-          <a:ext cx="0" cy="0"/>
-          <a:chOff x="0" y="0"/>
-          <a:chExt cx="0" cy="0"/>
-        </a:xfrm>
-      </p:grpSpPr>
-      <p:pic>
-        <p:nvPicPr>
-          <p:cNvPr id="3" name="Picture 2">
-            <a:extLst>
-              <a:ext uri="{FF2B5EF4-FFF2-40B4-BE49-F238E27FC236}">
-                <a16:creationId xmlns:a16="http://schemas.microsoft.com/office/drawing/2014/main" id="{0747A64E-D15C-43D0-B4C4-8A2644576285}"/>
-              </a:ext>
-            </a:extLst>
-          </p:cNvPr>
-          <p:cNvPicPr>
-            <a:picLocks noChangeAspect="1"/>
-          </p:cNvPicPr>
-          <p:nvPr/>
-        </p:nvPicPr>
-        <p:blipFill>
-          <a:blip r:embed="rId2"/>
-          <a:stretch>
-            <a:fillRect/>
-          </a:stretch>
-        </p:blipFill>
-        <p:spPr>
-          <a:xfrm>
-            <a:off x="643467" y="1179830"/>
-            <a:ext cx="10905066" cy="4498338"/>
-          </a:xfrm>
-          <a:prstGeom prst="rect">
-            <a:avLst/>
-          </a:prstGeom>
-        </p:spPr>
-      </p:pic>
-      <p:sp>
-        <p:nvSpPr>
-          <p:cNvPr id="4" name="Rectangle 3">
-            <a:extLst>
-              <a:ext uri="{FF2B5EF4-FFF2-40B4-BE49-F238E27FC236}">
-                <a16:creationId xmlns:a16="http://schemas.microsoft.com/office/drawing/2014/main" id="{DECA4EA2-FA37-4B82-BC4E-439AC3591EC2}"/>
-              </a:ext>
-            </a:extLst>
-          </p:cNvPr>
-          <p:cNvSpPr/>
-          <p:nvPr/>
-        </p:nvSpPr>
-        <p:spPr>
-          <a:xfrm>
-            <a:off x="494522" y="3275044"/>
-            <a:ext cx="2186473" cy="2276669"/>
-          </a:xfrm>
-          <a:prstGeom prst="rect">
-            <a:avLst/>
-          </a:prstGeom>
-          <a:noFill/>
-          <a:ln w="50800">
-            <a:solidFill>
-              <a:schemeClr val="accent4">
-                <a:lumMod val="60000"/>
-                <a:lumOff val="40000"/>
-              </a:schemeClr>
-            </a:solidFill>
-            <a:prstDash val="sysDash"/>
-          </a:ln>
-        </p:spPr>
-        <p:style>
-          <a:lnRef idx="2">
-            <a:schemeClr val="accent1">
-              <a:shade val="50000"/>
-            </a:schemeClr>
-          </a:lnRef>
-          <a:fillRef idx="1">
-            <a:schemeClr val="accent1"/>
-          </a:fillRef>
-          <a:effectRef idx="0">
-            <a:schemeClr val="accent1"/>
-          </a:effectRef>
-          <a:fontRef idx="minor">
-            <a:schemeClr val="lt1"/>
-          </a:fontRef>
-        </p:style>
-        <p:txBody>
-          <a:bodyPr rtlCol="0" anchor="ctr"/>
-          <a:lstStyle/>
-          <a:p>
-            <a:pPr algn="ctr"/>
-            <a:endParaRPr lang="en-US">
-              <a:noFill/>
-            </a:endParaRPr>
-          </a:p>
-        </p:txBody>
-      </p:sp>
-      <p:sp>
-        <p:nvSpPr>
-          <p:cNvPr id="5" name="Rectangle 4">
-            <a:extLst>
-              <a:ext uri="{FF2B5EF4-FFF2-40B4-BE49-F238E27FC236}">
-                <a16:creationId xmlns:a16="http://schemas.microsoft.com/office/drawing/2014/main" id="{0103C118-605B-490C-A702-5694237C3EF9}"/>
-              </a:ext>
-            </a:extLst>
-          </p:cNvPr>
-          <p:cNvSpPr/>
-          <p:nvPr/>
-        </p:nvSpPr>
-        <p:spPr>
-          <a:xfrm>
-            <a:off x="8979158" y="3275044"/>
-            <a:ext cx="2569375" cy="2052735"/>
-          </a:xfrm>
-          <a:prstGeom prst="rect">
-            <a:avLst/>
-          </a:prstGeom>
-          <a:noFill/>
-          <a:ln w="50800">
-            <a:solidFill>
-              <a:schemeClr val="accent4">
-                <a:lumMod val="60000"/>
-                <a:lumOff val="40000"/>
-              </a:schemeClr>
-            </a:solidFill>
-            <a:prstDash val="sysDash"/>
-          </a:ln>
-        </p:spPr>
-        <p:style>
-          <a:lnRef idx="2">
-            <a:schemeClr val="accent1">
-              <a:shade val="50000"/>
-            </a:schemeClr>
-          </a:lnRef>
-          <a:fillRef idx="1">
-            <a:schemeClr val="accent1"/>
-          </a:fillRef>
-          <a:effectRef idx="0">
-            <a:schemeClr val="accent1"/>
-          </a:effectRef>
-          <a:fontRef idx="minor">
-            <a:schemeClr val="lt1"/>
-          </a:fontRef>
-        </p:style>
-        <p:txBody>
-          <a:bodyPr rtlCol="0" anchor="ctr"/>
-          <a:lstStyle/>
-          <a:p>
-            <a:pPr algn="ctr"/>
-            <a:endParaRPr lang="en-US">
-              <a:noFill/>
-            </a:endParaRPr>
-          </a:p>
-        </p:txBody>
-      </p:sp>
-      <p:sp>
-        <p:nvSpPr>
-          <p:cNvPr id="6" name="Rectangle 5">
-            <a:extLst>
-              <a:ext uri="{FF2B5EF4-FFF2-40B4-BE49-F238E27FC236}">
-                <a16:creationId xmlns:a16="http://schemas.microsoft.com/office/drawing/2014/main" id="{B130E81F-6AF0-44E3-A57D-BA16FAEBB6D6}"/>
-              </a:ext>
-            </a:extLst>
-          </p:cNvPr>
-          <p:cNvSpPr/>
-          <p:nvPr/>
-        </p:nvSpPr>
-        <p:spPr>
-          <a:xfrm>
-            <a:off x="5952931" y="1250302"/>
-            <a:ext cx="1959428" cy="1184988"/>
-          </a:xfrm>
-          <a:prstGeom prst="rect">
-            <a:avLst/>
-          </a:prstGeom>
-          <a:noFill/>
-          <a:ln w="50800">
-            <a:solidFill>
-              <a:schemeClr val="accent2"/>
-            </a:solidFill>
-            <a:prstDash val="sysDash"/>
-          </a:ln>
-        </p:spPr>
-        <p:style>
-          <a:lnRef idx="2">
-            <a:schemeClr val="accent1">
-              <a:shade val="50000"/>
-            </a:schemeClr>
-          </a:lnRef>
-          <a:fillRef idx="1">
-            <a:schemeClr val="accent1"/>
-          </a:fillRef>
-          <a:effectRef idx="0">
-            <a:schemeClr val="accent1"/>
-          </a:effectRef>
-          <a:fontRef idx="minor">
-            <a:schemeClr val="lt1"/>
-          </a:fontRef>
-        </p:style>
-        <p:txBody>
-          <a:bodyPr rtlCol="0" anchor="ctr"/>
-          <a:lstStyle/>
-          <a:p>
-            <a:pPr algn="ctr"/>
-            <a:endParaRPr lang="en-US">
-              <a:noFill/>
-            </a:endParaRPr>
-          </a:p>
-        </p:txBody>
-      </p:sp>
-    </p:spTree>
-    <p:extLst>
-      <p:ext uri="{BB962C8B-B14F-4D97-AF65-F5344CB8AC3E}">
-        <p14:creationId xmlns:p14="http://schemas.microsoft.com/office/powerpoint/2010/main" val="3214791025"/>
       </p:ext>
     </p:extLst>
   </p:cSld>
@@ -4152,10 +4525,10 @@
       </p:grpSpPr>
       <p:pic>
         <p:nvPicPr>
-          <p:cNvPr id="3" name="Picture 2" descr="Timeline&#10;&#10;Description automatically generated">
-            <a:extLst>
-              <a:ext uri="{FF2B5EF4-FFF2-40B4-BE49-F238E27FC236}">
-                <a16:creationId xmlns:a16="http://schemas.microsoft.com/office/drawing/2014/main" id="{C548E360-3F46-47D4-9155-5A9474A57175}"/>
+          <p:cNvPr id="3" name="Picture 2">
+            <a:extLst>
+              <a:ext uri="{FF2B5EF4-FFF2-40B4-BE49-F238E27FC236}">
+                <a16:creationId xmlns:a16="http://schemas.microsoft.com/office/drawing/2014/main" id="{0747A64E-D15C-43D0-B4C4-8A2644576285}"/>
               </a:ext>
             </a:extLst>
           </p:cNvPr>
@@ -4185,7 +4558,7 @@
           <p:cNvPr id="4" name="Rectangle 3">
             <a:extLst>
               <a:ext uri="{FF2B5EF4-FFF2-40B4-BE49-F238E27FC236}">
-                <a16:creationId xmlns:a16="http://schemas.microsoft.com/office/drawing/2014/main" id="{B7614658-E7BD-4F6E-A1CD-93C8160AE3FA}"/>
+                <a16:creationId xmlns:a16="http://schemas.microsoft.com/office/drawing/2014/main" id="{DECA4EA2-FA37-4B82-BC4E-439AC3591EC2}"/>
               </a:ext>
             </a:extLst>
           </p:cNvPr>
@@ -4194,8 +4567,8 @@
         </p:nvSpPr>
         <p:spPr>
           <a:xfrm>
-            <a:off x="6624735" y="4450702"/>
-            <a:ext cx="1959428" cy="1502229"/>
+            <a:off x="494522" y="3275044"/>
+            <a:ext cx="2186473" cy="2276669"/>
           </a:xfrm>
           <a:prstGeom prst="rect">
             <a:avLst/>
@@ -4203,7 +4576,10 @@
           <a:noFill/>
           <a:ln w="50800">
             <a:solidFill>
-              <a:schemeClr val="accent2"/>
+              <a:schemeClr val="accent4">
+                <a:lumMod val="60000"/>
+                <a:lumOff val="40000"/>
+              </a:schemeClr>
             </a:solidFill>
             <a:prstDash val="sysDash"/>
           </a:ln>
@@ -4237,10 +4613,10 @@
       </p:sp>
       <p:sp>
         <p:nvSpPr>
-          <p:cNvPr id="7" name="Rectangle 6">
-            <a:extLst>
-              <a:ext uri="{FF2B5EF4-FFF2-40B4-BE49-F238E27FC236}">
-                <a16:creationId xmlns:a16="http://schemas.microsoft.com/office/drawing/2014/main" id="{703F2FA3-600A-4360-A3C8-D958CC1D87F4}"/>
+          <p:cNvPr id="5" name="Rectangle 4">
+            <a:extLst>
+              <a:ext uri="{FF2B5EF4-FFF2-40B4-BE49-F238E27FC236}">
+                <a16:creationId xmlns:a16="http://schemas.microsoft.com/office/drawing/2014/main" id="{0103C118-605B-490C-A702-5694237C3EF9}"/>
               </a:ext>
             </a:extLst>
           </p:cNvPr>
@@ -4249,8 +4625,8 @@
         </p:nvSpPr>
         <p:spPr>
           <a:xfrm>
-            <a:off x="5984033" y="1278294"/>
-            <a:ext cx="1959428" cy="1129004"/>
+            <a:off x="8979158" y="3275044"/>
+            <a:ext cx="2569375" cy="2052735"/>
           </a:xfrm>
           <a:prstGeom prst="rect">
             <a:avLst/>
@@ -4293,6 +4669,242 @@
           </a:p>
         </p:txBody>
       </p:sp>
+      <p:sp>
+        <p:nvSpPr>
+          <p:cNvPr id="6" name="Rectangle 5">
+            <a:extLst>
+              <a:ext uri="{FF2B5EF4-FFF2-40B4-BE49-F238E27FC236}">
+                <a16:creationId xmlns:a16="http://schemas.microsoft.com/office/drawing/2014/main" id="{B130E81F-6AF0-44E3-A57D-BA16FAEBB6D6}"/>
+              </a:ext>
+            </a:extLst>
+          </p:cNvPr>
+          <p:cNvSpPr/>
+          <p:nvPr/>
+        </p:nvSpPr>
+        <p:spPr>
+          <a:xfrm>
+            <a:off x="5952931" y="1250302"/>
+            <a:ext cx="1959428" cy="1184988"/>
+          </a:xfrm>
+          <a:prstGeom prst="rect">
+            <a:avLst/>
+          </a:prstGeom>
+          <a:noFill/>
+          <a:ln w="50800">
+            <a:solidFill>
+              <a:schemeClr val="accent2"/>
+            </a:solidFill>
+            <a:prstDash val="sysDash"/>
+          </a:ln>
+        </p:spPr>
+        <p:style>
+          <a:lnRef idx="2">
+            <a:schemeClr val="accent1">
+              <a:shade val="50000"/>
+            </a:schemeClr>
+          </a:lnRef>
+          <a:fillRef idx="1">
+            <a:schemeClr val="accent1"/>
+          </a:fillRef>
+          <a:effectRef idx="0">
+            <a:schemeClr val="accent1"/>
+          </a:effectRef>
+          <a:fontRef idx="minor">
+            <a:schemeClr val="lt1"/>
+          </a:fontRef>
+        </p:style>
+        <p:txBody>
+          <a:bodyPr rtlCol="0" anchor="ctr"/>
+          <a:lstStyle/>
+          <a:p>
+            <a:pPr algn="ctr"/>
+            <a:endParaRPr lang="en-US">
+              <a:noFill/>
+            </a:endParaRPr>
+          </a:p>
+        </p:txBody>
+      </p:sp>
+    </p:spTree>
+    <p:extLst>
+      <p:ext uri="{BB962C8B-B14F-4D97-AF65-F5344CB8AC3E}">
+        <p14:creationId xmlns:p14="http://schemas.microsoft.com/office/powerpoint/2010/main" val="3214791025"/>
+      </p:ext>
+    </p:extLst>
+  </p:cSld>
+  <p:clrMapOvr>
+    <a:masterClrMapping/>
+  </p:clrMapOvr>
+</p:sld>
+</file>
+
+<file path=ppt/slides/slide7.xml><?xml version="1.0" encoding="utf-8"?>
+<p:sld xmlns:a="http://schemas.openxmlformats.org/drawingml/2006/main" xmlns:r="http://schemas.openxmlformats.org/officeDocument/2006/relationships" xmlns:p="http://schemas.openxmlformats.org/presentationml/2006/main">
+  <p:cSld>
+    <p:bg>
+      <p:bgPr>
+        <a:solidFill>
+          <a:schemeClr val="bg1"/>
+        </a:solidFill>
+        <a:effectLst/>
+      </p:bgPr>
+    </p:bg>
+    <p:spTree>
+      <p:nvGrpSpPr>
+        <p:cNvPr id="1" name=""/>
+        <p:cNvGrpSpPr/>
+        <p:nvPr/>
+      </p:nvGrpSpPr>
+      <p:grpSpPr>
+        <a:xfrm>
+          <a:off x="0" y="0"/>
+          <a:ext cx="0" cy="0"/>
+          <a:chOff x="0" y="0"/>
+          <a:chExt cx="0" cy="0"/>
+        </a:xfrm>
+      </p:grpSpPr>
+      <p:pic>
+        <p:nvPicPr>
+          <p:cNvPr id="3" name="Picture 2" descr="Timeline&#10;&#10;Description automatically generated">
+            <a:extLst>
+              <a:ext uri="{FF2B5EF4-FFF2-40B4-BE49-F238E27FC236}">
+                <a16:creationId xmlns:a16="http://schemas.microsoft.com/office/drawing/2014/main" id="{C548E360-3F46-47D4-9155-5A9474A57175}"/>
+              </a:ext>
+            </a:extLst>
+          </p:cNvPr>
+          <p:cNvPicPr>
+            <a:picLocks noChangeAspect="1"/>
+          </p:cNvPicPr>
+          <p:nvPr/>
+        </p:nvPicPr>
+        <p:blipFill>
+          <a:blip r:embed="rId2"/>
+          <a:stretch>
+            <a:fillRect/>
+          </a:stretch>
+        </p:blipFill>
+        <p:spPr>
+          <a:xfrm>
+            <a:off x="643467" y="1179830"/>
+            <a:ext cx="10905066" cy="4498338"/>
+          </a:xfrm>
+          <a:prstGeom prst="rect">
+            <a:avLst/>
+          </a:prstGeom>
+        </p:spPr>
+      </p:pic>
+      <p:sp>
+        <p:nvSpPr>
+          <p:cNvPr id="4" name="Rectangle 3">
+            <a:extLst>
+              <a:ext uri="{FF2B5EF4-FFF2-40B4-BE49-F238E27FC236}">
+                <a16:creationId xmlns:a16="http://schemas.microsoft.com/office/drawing/2014/main" id="{B7614658-E7BD-4F6E-A1CD-93C8160AE3FA}"/>
+              </a:ext>
+            </a:extLst>
+          </p:cNvPr>
+          <p:cNvSpPr/>
+          <p:nvPr/>
+        </p:nvSpPr>
+        <p:spPr>
+          <a:xfrm>
+            <a:off x="6624735" y="4450702"/>
+            <a:ext cx="1959428" cy="1502229"/>
+          </a:xfrm>
+          <a:prstGeom prst="rect">
+            <a:avLst/>
+          </a:prstGeom>
+          <a:noFill/>
+          <a:ln w="50800">
+            <a:solidFill>
+              <a:schemeClr val="accent2"/>
+            </a:solidFill>
+            <a:prstDash val="sysDash"/>
+          </a:ln>
+        </p:spPr>
+        <p:style>
+          <a:lnRef idx="2">
+            <a:schemeClr val="accent1">
+              <a:shade val="50000"/>
+            </a:schemeClr>
+          </a:lnRef>
+          <a:fillRef idx="1">
+            <a:schemeClr val="accent1"/>
+          </a:fillRef>
+          <a:effectRef idx="0">
+            <a:schemeClr val="accent1"/>
+          </a:effectRef>
+          <a:fontRef idx="minor">
+            <a:schemeClr val="lt1"/>
+          </a:fontRef>
+        </p:style>
+        <p:txBody>
+          <a:bodyPr rtlCol="0" anchor="ctr"/>
+          <a:lstStyle/>
+          <a:p>
+            <a:pPr algn="ctr"/>
+            <a:endParaRPr lang="en-US">
+              <a:noFill/>
+            </a:endParaRPr>
+          </a:p>
+        </p:txBody>
+      </p:sp>
+      <p:sp>
+        <p:nvSpPr>
+          <p:cNvPr id="7" name="Rectangle 6">
+            <a:extLst>
+              <a:ext uri="{FF2B5EF4-FFF2-40B4-BE49-F238E27FC236}">
+                <a16:creationId xmlns:a16="http://schemas.microsoft.com/office/drawing/2014/main" id="{703F2FA3-600A-4360-A3C8-D958CC1D87F4}"/>
+              </a:ext>
+            </a:extLst>
+          </p:cNvPr>
+          <p:cNvSpPr/>
+          <p:nvPr/>
+        </p:nvSpPr>
+        <p:spPr>
+          <a:xfrm>
+            <a:off x="5984033" y="1278294"/>
+            <a:ext cx="1959428" cy="1129004"/>
+          </a:xfrm>
+          <a:prstGeom prst="rect">
+            <a:avLst/>
+          </a:prstGeom>
+          <a:noFill/>
+          <a:ln w="50800">
+            <a:solidFill>
+              <a:schemeClr val="accent4">
+                <a:lumMod val="60000"/>
+                <a:lumOff val="40000"/>
+              </a:schemeClr>
+            </a:solidFill>
+            <a:prstDash val="sysDash"/>
+          </a:ln>
+        </p:spPr>
+        <p:style>
+          <a:lnRef idx="2">
+            <a:schemeClr val="accent1">
+              <a:shade val="50000"/>
+            </a:schemeClr>
+          </a:lnRef>
+          <a:fillRef idx="1">
+            <a:schemeClr val="accent1"/>
+          </a:fillRef>
+          <a:effectRef idx="0">
+            <a:schemeClr val="accent1"/>
+          </a:effectRef>
+          <a:fontRef idx="minor">
+            <a:schemeClr val="lt1"/>
+          </a:fontRef>
+        </p:style>
+        <p:txBody>
+          <a:bodyPr rtlCol="0" anchor="ctr"/>
+          <a:lstStyle/>
+          <a:p>
+            <a:pPr algn="ctr"/>
+            <a:endParaRPr lang="en-US">
+              <a:noFill/>
+            </a:endParaRPr>
+          </a:p>
+        </p:txBody>
+      </p:sp>
     </p:spTree>
     <p:extLst>
       <p:ext uri="{BB962C8B-B14F-4D97-AF65-F5344CB8AC3E}">
@@ -4306,7 +4918,7 @@
 </p:sld>
 </file>
 
-<file path=ppt/slides/slide7.xml><?xml version="1.0" encoding="utf-8"?>
+<file path=ppt/slides/slide8.xml><?xml version="1.0" encoding="utf-8"?>
 <p:sld xmlns:a="http://schemas.openxmlformats.org/drawingml/2006/main" xmlns:r="http://schemas.openxmlformats.org/officeDocument/2006/relationships" xmlns:p="http://schemas.openxmlformats.org/presentationml/2006/main">
   <p:cSld>
     <p:bg>

</xml_diff>

<commit_message>
added intermediate app slide
</commit_message>
<xml_diff>
--- a/docs/images/slide-images.pptx
+++ b/docs/images/slide-images.pptx
@@ -266,7 +266,7 @@
           <a:p>
             <a:fld id="{25CD4D0C-3F69-4524-99ED-CD9560AA544B}" type="datetimeFigureOut">
               <a:rPr lang="en-US" smtClean="0"/>
-              <a:t>3/12/2021</a:t>
+              <a:t>4/2/2021</a:t>
             </a:fld>
             <a:endParaRPr lang="en-US"/>
           </a:p>
@@ -464,7 +464,7 @@
           <a:p>
             <a:fld id="{25CD4D0C-3F69-4524-99ED-CD9560AA544B}" type="datetimeFigureOut">
               <a:rPr lang="en-US" smtClean="0"/>
-              <a:t>3/12/2021</a:t>
+              <a:t>4/2/2021</a:t>
             </a:fld>
             <a:endParaRPr lang="en-US"/>
           </a:p>
@@ -672,7 +672,7 @@
           <a:p>
             <a:fld id="{25CD4D0C-3F69-4524-99ED-CD9560AA544B}" type="datetimeFigureOut">
               <a:rPr lang="en-US" smtClean="0"/>
-              <a:t>3/12/2021</a:t>
+              <a:t>4/2/2021</a:t>
             </a:fld>
             <a:endParaRPr lang="en-US"/>
           </a:p>
@@ -870,7 +870,7 @@
           <a:p>
             <a:fld id="{25CD4D0C-3F69-4524-99ED-CD9560AA544B}" type="datetimeFigureOut">
               <a:rPr lang="en-US" smtClean="0"/>
-              <a:t>3/12/2021</a:t>
+              <a:t>4/2/2021</a:t>
             </a:fld>
             <a:endParaRPr lang="en-US"/>
           </a:p>
@@ -1145,7 +1145,7 @@
           <a:p>
             <a:fld id="{25CD4D0C-3F69-4524-99ED-CD9560AA544B}" type="datetimeFigureOut">
               <a:rPr lang="en-US" smtClean="0"/>
-              <a:t>3/12/2021</a:t>
+              <a:t>4/2/2021</a:t>
             </a:fld>
             <a:endParaRPr lang="en-US"/>
           </a:p>
@@ -1410,7 +1410,7 @@
           <a:p>
             <a:fld id="{25CD4D0C-3F69-4524-99ED-CD9560AA544B}" type="datetimeFigureOut">
               <a:rPr lang="en-US" smtClean="0"/>
-              <a:t>3/12/2021</a:t>
+              <a:t>4/2/2021</a:t>
             </a:fld>
             <a:endParaRPr lang="en-US"/>
           </a:p>
@@ -1822,7 +1822,7 @@
           <a:p>
             <a:fld id="{25CD4D0C-3F69-4524-99ED-CD9560AA544B}" type="datetimeFigureOut">
               <a:rPr lang="en-US" smtClean="0"/>
-              <a:t>3/12/2021</a:t>
+              <a:t>4/2/2021</a:t>
             </a:fld>
             <a:endParaRPr lang="en-US"/>
           </a:p>
@@ -1963,7 +1963,7 @@
           <a:p>
             <a:fld id="{25CD4D0C-3F69-4524-99ED-CD9560AA544B}" type="datetimeFigureOut">
               <a:rPr lang="en-US" smtClean="0"/>
-              <a:t>3/12/2021</a:t>
+              <a:t>4/2/2021</a:t>
             </a:fld>
             <a:endParaRPr lang="en-US"/>
           </a:p>
@@ -2076,7 +2076,7 @@
           <a:p>
             <a:fld id="{25CD4D0C-3F69-4524-99ED-CD9560AA544B}" type="datetimeFigureOut">
               <a:rPr lang="en-US" smtClean="0"/>
-              <a:t>3/12/2021</a:t>
+              <a:t>4/2/2021</a:t>
             </a:fld>
             <a:endParaRPr lang="en-US"/>
           </a:p>
@@ -2387,7 +2387,7 @@
           <a:p>
             <a:fld id="{25CD4D0C-3F69-4524-99ED-CD9560AA544B}" type="datetimeFigureOut">
               <a:rPr lang="en-US" smtClean="0"/>
-              <a:t>3/12/2021</a:t>
+              <a:t>4/2/2021</a:t>
             </a:fld>
             <a:endParaRPr lang="en-US"/>
           </a:p>
@@ -2675,7 +2675,7 @@
           <a:p>
             <a:fld id="{25CD4D0C-3F69-4524-99ED-CD9560AA544B}" type="datetimeFigureOut">
               <a:rPr lang="en-US" smtClean="0"/>
-              <a:t>3/12/2021</a:t>
+              <a:t>4/2/2021</a:t>
             </a:fld>
             <a:endParaRPr lang="en-US"/>
           </a:p>
@@ -2916,7 +2916,7 @@
           <a:p>
             <a:fld id="{25CD4D0C-3F69-4524-99ED-CD9560AA544B}" type="datetimeFigureOut">
               <a:rPr lang="en-US" smtClean="0"/>
-              <a:t>3/12/2021</a:t>
+              <a:t>4/2/2021</a:t>
             </a:fld>
             <a:endParaRPr lang="en-US"/>
           </a:p>

</xml_diff>

<commit_message>
added interm file slide
</commit_message>
<xml_diff>
--- a/docs/images/slide-images.pptx
+++ b/docs/images/slide-images.pptx
@@ -6,13 +6,14 @@
   </p:sldMasterIdLst>
   <p:sldIdLst>
     <p:sldId id="267" r:id="rId2"/>
-    <p:sldId id="256" r:id="rId3"/>
-    <p:sldId id="258" r:id="rId4"/>
-    <p:sldId id="260" r:id="rId5"/>
-    <p:sldId id="259" r:id="rId6"/>
-    <p:sldId id="263" r:id="rId7"/>
-    <p:sldId id="261" r:id="rId8"/>
-    <p:sldId id="262" r:id="rId9"/>
+    <p:sldId id="268" r:id="rId3"/>
+    <p:sldId id="256" r:id="rId4"/>
+    <p:sldId id="258" r:id="rId5"/>
+    <p:sldId id="260" r:id="rId6"/>
+    <p:sldId id="259" r:id="rId7"/>
+    <p:sldId id="263" r:id="rId8"/>
+    <p:sldId id="261" r:id="rId9"/>
+    <p:sldId id="262" r:id="rId10"/>
   </p:sldIdLst>
   <p:sldSz cx="12192000" cy="6858000"/>
   <p:notesSz cx="6858000" cy="9144000"/>
@@ -266,7 +267,7 @@
           <a:p>
             <a:fld id="{25CD4D0C-3F69-4524-99ED-CD9560AA544B}" type="datetimeFigureOut">
               <a:rPr lang="en-US" smtClean="0"/>
-              <a:t>4/2/2021</a:t>
+              <a:t>4/13/2021</a:t>
             </a:fld>
             <a:endParaRPr lang="en-US"/>
           </a:p>
@@ -464,7 +465,7 @@
           <a:p>
             <a:fld id="{25CD4D0C-3F69-4524-99ED-CD9560AA544B}" type="datetimeFigureOut">
               <a:rPr lang="en-US" smtClean="0"/>
-              <a:t>4/2/2021</a:t>
+              <a:t>4/13/2021</a:t>
             </a:fld>
             <a:endParaRPr lang="en-US"/>
           </a:p>
@@ -672,7 +673,7 @@
           <a:p>
             <a:fld id="{25CD4D0C-3F69-4524-99ED-CD9560AA544B}" type="datetimeFigureOut">
               <a:rPr lang="en-US" smtClean="0"/>
-              <a:t>4/2/2021</a:t>
+              <a:t>4/13/2021</a:t>
             </a:fld>
             <a:endParaRPr lang="en-US"/>
           </a:p>
@@ -870,7 +871,7 @@
           <a:p>
             <a:fld id="{25CD4D0C-3F69-4524-99ED-CD9560AA544B}" type="datetimeFigureOut">
               <a:rPr lang="en-US" smtClean="0"/>
-              <a:t>4/2/2021</a:t>
+              <a:t>4/13/2021</a:t>
             </a:fld>
             <a:endParaRPr lang="en-US"/>
           </a:p>
@@ -1145,7 +1146,7 @@
           <a:p>
             <a:fld id="{25CD4D0C-3F69-4524-99ED-CD9560AA544B}" type="datetimeFigureOut">
               <a:rPr lang="en-US" smtClean="0"/>
-              <a:t>4/2/2021</a:t>
+              <a:t>4/13/2021</a:t>
             </a:fld>
             <a:endParaRPr lang="en-US"/>
           </a:p>
@@ -1410,7 +1411,7 @@
           <a:p>
             <a:fld id="{25CD4D0C-3F69-4524-99ED-CD9560AA544B}" type="datetimeFigureOut">
               <a:rPr lang="en-US" smtClean="0"/>
-              <a:t>4/2/2021</a:t>
+              <a:t>4/13/2021</a:t>
             </a:fld>
             <a:endParaRPr lang="en-US"/>
           </a:p>
@@ -1822,7 +1823,7 @@
           <a:p>
             <a:fld id="{25CD4D0C-3F69-4524-99ED-CD9560AA544B}" type="datetimeFigureOut">
               <a:rPr lang="en-US" smtClean="0"/>
-              <a:t>4/2/2021</a:t>
+              <a:t>4/13/2021</a:t>
             </a:fld>
             <a:endParaRPr lang="en-US"/>
           </a:p>
@@ -1963,7 +1964,7 @@
           <a:p>
             <a:fld id="{25CD4D0C-3F69-4524-99ED-CD9560AA544B}" type="datetimeFigureOut">
               <a:rPr lang="en-US" smtClean="0"/>
-              <a:t>4/2/2021</a:t>
+              <a:t>4/13/2021</a:t>
             </a:fld>
             <a:endParaRPr lang="en-US"/>
           </a:p>
@@ -2076,7 +2077,7 @@
           <a:p>
             <a:fld id="{25CD4D0C-3F69-4524-99ED-CD9560AA544B}" type="datetimeFigureOut">
               <a:rPr lang="en-US" smtClean="0"/>
-              <a:t>4/2/2021</a:t>
+              <a:t>4/13/2021</a:t>
             </a:fld>
             <a:endParaRPr lang="en-US"/>
           </a:p>
@@ -2387,7 +2388,7 @@
           <a:p>
             <a:fld id="{25CD4D0C-3F69-4524-99ED-CD9560AA544B}" type="datetimeFigureOut">
               <a:rPr lang="en-US" smtClean="0"/>
-              <a:t>4/2/2021</a:t>
+              <a:t>4/13/2021</a:t>
             </a:fld>
             <a:endParaRPr lang="en-US"/>
           </a:p>
@@ -2675,7 +2676,7 @@
           <a:p>
             <a:fld id="{25CD4D0C-3F69-4524-99ED-CD9560AA544B}" type="datetimeFigureOut">
               <a:rPr lang="en-US" smtClean="0"/>
-              <a:t>4/2/2021</a:t>
+              <a:t>4/13/2021</a:t>
             </a:fld>
             <a:endParaRPr lang="en-US"/>
           </a:p>
@@ -2916,7 +2917,7 @@
           <a:p>
             <a:fld id="{25CD4D0C-3F69-4524-99ED-CD9560AA544B}" type="datetimeFigureOut">
               <a:rPr lang="en-US" smtClean="0"/>
-              <a:t>4/2/2021</a:t>
+              <a:t>4/13/2021</a:t>
             </a:fld>
             <a:endParaRPr lang="en-US"/>
           </a:p>
@@ -3944,6 +3945,229 @@
           <a:chExt cx="0" cy="0"/>
         </a:xfrm>
       </p:grpSpPr>
+      <p:pic>
+        <p:nvPicPr>
+          <p:cNvPr id="3" name="Picture 2">
+            <a:extLst>
+              <a:ext uri="{FF2B5EF4-FFF2-40B4-BE49-F238E27FC236}">
+                <a16:creationId xmlns:a16="http://schemas.microsoft.com/office/drawing/2014/main" id="{1DD7354F-0472-4BB9-A104-C3F6840FF519}"/>
+              </a:ext>
+            </a:extLst>
+          </p:cNvPr>
+          <p:cNvPicPr>
+            <a:picLocks noChangeAspect="1"/>
+          </p:cNvPicPr>
+          <p:nvPr/>
+        </p:nvPicPr>
+        <p:blipFill>
+          <a:blip r:embed="rId2"/>
+          <a:stretch>
+            <a:fillRect/>
+          </a:stretch>
+        </p:blipFill>
+        <p:spPr>
+          <a:xfrm>
+            <a:off x="659586" y="563268"/>
+            <a:ext cx="3762900" cy="3753374"/>
+          </a:xfrm>
+          <a:prstGeom prst="rect">
+            <a:avLst/>
+          </a:prstGeom>
+          <a:effectLst>
+            <a:outerShdw blurRad="50800" dist="38100" dir="2700000" algn="tl" rotWithShape="0">
+              <a:prstClr val="black">
+                <a:alpha val="40000"/>
+              </a:prstClr>
+            </a:outerShdw>
+          </a:effectLst>
+        </p:spPr>
+      </p:pic>
+      <p:pic>
+        <p:nvPicPr>
+          <p:cNvPr id="5" name="Picture 4">
+            <a:extLst>
+              <a:ext uri="{FF2B5EF4-FFF2-40B4-BE49-F238E27FC236}">
+                <a16:creationId xmlns:a16="http://schemas.microsoft.com/office/drawing/2014/main" id="{9555D9F7-42A6-4F1B-9AA3-BF42DD362D00}"/>
+              </a:ext>
+            </a:extLst>
+          </p:cNvPr>
+          <p:cNvPicPr>
+            <a:picLocks noChangeAspect="1"/>
+          </p:cNvPicPr>
+          <p:nvPr/>
+        </p:nvPicPr>
+        <p:blipFill>
+          <a:blip r:embed="rId3"/>
+          <a:stretch>
+            <a:fillRect/>
+          </a:stretch>
+        </p:blipFill>
+        <p:spPr>
+          <a:xfrm>
+            <a:off x="4063774" y="1589634"/>
+            <a:ext cx="3705742" cy="3267531"/>
+          </a:xfrm>
+          <a:prstGeom prst="rect">
+            <a:avLst/>
+          </a:prstGeom>
+          <a:effectLst>
+            <a:outerShdw blurRad="50800" dist="38100" dir="2700000" algn="tl" rotWithShape="0">
+              <a:prstClr val="black">
+                <a:alpha val="40000"/>
+              </a:prstClr>
+            </a:outerShdw>
+          </a:effectLst>
+        </p:spPr>
+      </p:pic>
+      <p:pic>
+        <p:nvPicPr>
+          <p:cNvPr id="7" name="Picture 6">
+            <a:extLst>
+              <a:ext uri="{FF2B5EF4-FFF2-40B4-BE49-F238E27FC236}">
+                <a16:creationId xmlns:a16="http://schemas.microsoft.com/office/drawing/2014/main" id="{F9C29B9F-3319-4509-9A80-8F7EAFE2A24E}"/>
+              </a:ext>
+            </a:extLst>
+          </p:cNvPr>
+          <p:cNvPicPr>
+            <a:picLocks noChangeAspect="1"/>
+          </p:cNvPicPr>
+          <p:nvPr/>
+        </p:nvPicPr>
+        <p:blipFill>
+          <a:blip r:embed="rId4"/>
+          <a:stretch>
+            <a:fillRect/>
+          </a:stretch>
+        </p:blipFill>
+        <p:spPr>
+          <a:xfrm>
+            <a:off x="7427169" y="3610947"/>
+            <a:ext cx="4521158" cy="2448267"/>
+          </a:xfrm>
+          <a:prstGeom prst="rect">
+            <a:avLst/>
+          </a:prstGeom>
+          <a:effectLst>
+            <a:outerShdw blurRad="50800" dist="38100" dir="2700000" algn="tl" rotWithShape="0">
+              <a:prstClr val="black">
+                <a:alpha val="40000"/>
+              </a:prstClr>
+            </a:outerShdw>
+          </a:effectLst>
+        </p:spPr>
+      </p:pic>
+      <p:cxnSp>
+        <p:nvCxnSpPr>
+          <p:cNvPr id="9" name="Connector: Elbow 8">
+            <a:extLst>
+              <a:ext uri="{FF2B5EF4-FFF2-40B4-BE49-F238E27FC236}">
+                <a16:creationId xmlns:a16="http://schemas.microsoft.com/office/drawing/2014/main" id="{3547C124-E15F-45FB-BAAD-7D2188B905AE}"/>
+              </a:ext>
+            </a:extLst>
+          </p:cNvPr>
+          <p:cNvCxnSpPr>
+            <a:cxnSpLocks/>
+          </p:cNvCxnSpPr>
+          <p:nvPr/>
+        </p:nvCxnSpPr>
+        <p:spPr>
+          <a:xfrm>
+            <a:off x="2220686" y="2575249"/>
+            <a:ext cx="1996841" cy="177282"/>
+          </a:xfrm>
+          <a:prstGeom prst="bentConnector3">
+            <a:avLst/>
+          </a:prstGeom>
+          <a:ln w="31750">
+            <a:tailEnd type="triangle"/>
+          </a:ln>
+        </p:spPr>
+        <p:style>
+          <a:lnRef idx="2">
+            <a:schemeClr val="accent2"/>
+          </a:lnRef>
+          <a:fillRef idx="0">
+            <a:schemeClr val="accent2"/>
+          </a:fillRef>
+          <a:effectRef idx="1">
+            <a:schemeClr val="accent2"/>
+          </a:effectRef>
+          <a:fontRef idx="minor">
+            <a:schemeClr val="tx1"/>
+          </a:fontRef>
+        </p:style>
+      </p:cxnSp>
+      <p:cxnSp>
+        <p:nvCxnSpPr>
+          <p:cNvPr id="11" name="Connector: Elbow 10">
+            <a:extLst>
+              <a:ext uri="{FF2B5EF4-FFF2-40B4-BE49-F238E27FC236}">
+                <a16:creationId xmlns:a16="http://schemas.microsoft.com/office/drawing/2014/main" id="{EA4B4DF2-5EB8-4174-9124-D99983486297}"/>
+              </a:ext>
+            </a:extLst>
+          </p:cNvPr>
+          <p:cNvCxnSpPr>
+            <a:cxnSpLocks/>
+          </p:cNvCxnSpPr>
+          <p:nvPr/>
+        </p:nvCxnSpPr>
+        <p:spPr>
+          <a:xfrm>
+            <a:off x="5673012" y="3610947"/>
+            <a:ext cx="1968759" cy="1138335"/>
+          </a:xfrm>
+          <a:prstGeom prst="bentConnector3">
+            <a:avLst/>
+          </a:prstGeom>
+          <a:ln w="31750">
+            <a:tailEnd type="triangle"/>
+          </a:ln>
+        </p:spPr>
+        <p:style>
+          <a:lnRef idx="1">
+            <a:schemeClr val="accent2"/>
+          </a:lnRef>
+          <a:fillRef idx="0">
+            <a:schemeClr val="accent2"/>
+          </a:fillRef>
+          <a:effectRef idx="0">
+            <a:schemeClr val="accent2"/>
+          </a:effectRef>
+          <a:fontRef idx="minor">
+            <a:schemeClr val="tx1"/>
+          </a:fontRef>
+        </p:style>
+      </p:cxnSp>
+    </p:spTree>
+    <p:extLst>
+      <p:ext uri="{BB962C8B-B14F-4D97-AF65-F5344CB8AC3E}">
+        <p14:creationId xmlns:p14="http://schemas.microsoft.com/office/powerpoint/2010/main" val="1350631994"/>
+      </p:ext>
+    </p:extLst>
+  </p:cSld>
+  <p:clrMapOvr>
+    <a:masterClrMapping/>
+  </p:clrMapOvr>
+</p:sld>
+</file>
+
+<file path=ppt/slides/slide3.xml><?xml version="1.0" encoding="utf-8"?>
+<p:sld xmlns:a="http://schemas.openxmlformats.org/drawingml/2006/main" xmlns:r="http://schemas.openxmlformats.org/officeDocument/2006/relationships" xmlns:p="http://schemas.openxmlformats.org/presentationml/2006/main">
+  <p:cSld>
+    <p:spTree>
+      <p:nvGrpSpPr>
+        <p:cNvPr id="1" name=""/>
+        <p:cNvGrpSpPr/>
+        <p:nvPr/>
+      </p:nvGrpSpPr>
+      <p:grpSpPr>
+        <a:xfrm>
+          <a:off x="0" y="0"/>
+          <a:ext cx="0" cy="0"/>
+          <a:chOff x="0" y="0"/>
+          <a:chExt cx="0" cy="0"/>
+        </a:xfrm>
+      </p:grpSpPr>
       <p:grpSp>
         <p:nvGrpSpPr>
           <p:cNvPr id="12" name="Group 11">
@@ -4138,7 +4362,7 @@
 </p:sld>
 </file>
 
-<file path=ppt/slides/slide3.xml><?xml version="1.0" encoding="utf-8"?>
+<file path=ppt/slides/slide4.xml><?xml version="1.0" encoding="utf-8"?>
 <p:sld xmlns:a="http://schemas.openxmlformats.org/drawingml/2006/main" xmlns:r="http://schemas.openxmlformats.org/officeDocument/2006/relationships" xmlns:p="http://schemas.openxmlformats.org/presentationml/2006/main">
   <p:cSld>
     <p:spTree>
@@ -4349,7 +4573,7 @@
 </p:sld>
 </file>
 
-<file path=ppt/slides/slide4.xml><?xml version="1.0" encoding="utf-8"?>
+<file path=ppt/slides/slide5.xml><?xml version="1.0" encoding="utf-8"?>
 <p:sld xmlns:a="http://schemas.openxmlformats.org/drawingml/2006/main" xmlns:r="http://schemas.openxmlformats.org/officeDocument/2006/relationships" xmlns:p="http://schemas.openxmlformats.org/presentationml/2006/main">
   <p:cSld>
     <p:spTree>
@@ -4438,7 +4662,7 @@
 </p:sld>
 </file>
 
-<file path=ppt/slides/slide5.xml><?xml version="1.0" encoding="utf-8"?>
+<file path=ppt/slides/slide6.xml><?xml version="1.0" encoding="utf-8"?>
 <p:sld xmlns:a="http://schemas.openxmlformats.org/drawingml/2006/main" xmlns:r="http://schemas.openxmlformats.org/officeDocument/2006/relationships" xmlns:p="http://schemas.openxmlformats.org/presentationml/2006/main">
   <p:cSld>
     <p:spTree>
@@ -4489,245 +4713,6 @@
     <p:extLst>
       <p:ext uri="{BB962C8B-B14F-4D97-AF65-F5344CB8AC3E}">
         <p14:creationId xmlns:p14="http://schemas.microsoft.com/office/powerpoint/2010/main" val="1532331343"/>
-      </p:ext>
-    </p:extLst>
-  </p:cSld>
-  <p:clrMapOvr>
-    <a:masterClrMapping/>
-  </p:clrMapOvr>
-</p:sld>
-</file>
-
-<file path=ppt/slides/slide6.xml><?xml version="1.0" encoding="utf-8"?>
-<p:sld xmlns:a="http://schemas.openxmlformats.org/drawingml/2006/main" xmlns:r="http://schemas.openxmlformats.org/officeDocument/2006/relationships" xmlns:p="http://schemas.openxmlformats.org/presentationml/2006/main">
-  <p:cSld>
-    <p:bg>
-      <p:bgPr>
-        <a:solidFill>
-          <a:schemeClr val="bg1"/>
-        </a:solidFill>
-        <a:effectLst/>
-      </p:bgPr>
-    </p:bg>
-    <p:spTree>
-      <p:nvGrpSpPr>
-        <p:cNvPr id="1" name=""/>
-        <p:cNvGrpSpPr/>
-        <p:nvPr/>
-      </p:nvGrpSpPr>
-      <p:grpSpPr>
-        <a:xfrm>
-          <a:off x="0" y="0"/>
-          <a:ext cx="0" cy="0"/>
-          <a:chOff x="0" y="0"/>
-          <a:chExt cx="0" cy="0"/>
-        </a:xfrm>
-      </p:grpSpPr>
-      <p:pic>
-        <p:nvPicPr>
-          <p:cNvPr id="3" name="Picture 2">
-            <a:extLst>
-              <a:ext uri="{FF2B5EF4-FFF2-40B4-BE49-F238E27FC236}">
-                <a16:creationId xmlns:a16="http://schemas.microsoft.com/office/drawing/2014/main" id="{0747A64E-D15C-43D0-B4C4-8A2644576285}"/>
-              </a:ext>
-            </a:extLst>
-          </p:cNvPr>
-          <p:cNvPicPr>
-            <a:picLocks noChangeAspect="1"/>
-          </p:cNvPicPr>
-          <p:nvPr/>
-        </p:nvPicPr>
-        <p:blipFill>
-          <a:blip r:embed="rId2"/>
-          <a:stretch>
-            <a:fillRect/>
-          </a:stretch>
-        </p:blipFill>
-        <p:spPr>
-          <a:xfrm>
-            <a:off x="643467" y="1179830"/>
-            <a:ext cx="10905066" cy="4498338"/>
-          </a:xfrm>
-          <a:prstGeom prst="rect">
-            <a:avLst/>
-          </a:prstGeom>
-        </p:spPr>
-      </p:pic>
-      <p:sp>
-        <p:nvSpPr>
-          <p:cNvPr id="4" name="Rectangle 3">
-            <a:extLst>
-              <a:ext uri="{FF2B5EF4-FFF2-40B4-BE49-F238E27FC236}">
-                <a16:creationId xmlns:a16="http://schemas.microsoft.com/office/drawing/2014/main" id="{DECA4EA2-FA37-4B82-BC4E-439AC3591EC2}"/>
-              </a:ext>
-            </a:extLst>
-          </p:cNvPr>
-          <p:cNvSpPr/>
-          <p:nvPr/>
-        </p:nvSpPr>
-        <p:spPr>
-          <a:xfrm>
-            <a:off x="494522" y="3275044"/>
-            <a:ext cx="2186473" cy="2276669"/>
-          </a:xfrm>
-          <a:prstGeom prst="rect">
-            <a:avLst/>
-          </a:prstGeom>
-          <a:noFill/>
-          <a:ln w="50800">
-            <a:solidFill>
-              <a:schemeClr val="accent4">
-                <a:lumMod val="60000"/>
-                <a:lumOff val="40000"/>
-              </a:schemeClr>
-            </a:solidFill>
-            <a:prstDash val="sysDash"/>
-          </a:ln>
-        </p:spPr>
-        <p:style>
-          <a:lnRef idx="2">
-            <a:schemeClr val="accent1">
-              <a:shade val="50000"/>
-            </a:schemeClr>
-          </a:lnRef>
-          <a:fillRef idx="1">
-            <a:schemeClr val="accent1"/>
-          </a:fillRef>
-          <a:effectRef idx="0">
-            <a:schemeClr val="accent1"/>
-          </a:effectRef>
-          <a:fontRef idx="minor">
-            <a:schemeClr val="lt1"/>
-          </a:fontRef>
-        </p:style>
-        <p:txBody>
-          <a:bodyPr rtlCol="0" anchor="ctr"/>
-          <a:lstStyle/>
-          <a:p>
-            <a:pPr algn="ctr"/>
-            <a:endParaRPr lang="en-US">
-              <a:noFill/>
-            </a:endParaRPr>
-          </a:p>
-        </p:txBody>
-      </p:sp>
-      <p:sp>
-        <p:nvSpPr>
-          <p:cNvPr id="5" name="Rectangle 4">
-            <a:extLst>
-              <a:ext uri="{FF2B5EF4-FFF2-40B4-BE49-F238E27FC236}">
-                <a16:creationId xmlns:a16="http://schemas.microsoft.com/office/drawing/2014/main" id="{0103C118-605B-490C-A702-5694237C3EF9}"/>
-              </a:ext>
-            </a:extLst>
-          </p:cNvPr>
-          <p:cNvSpPr/>
-          <p:nvPr/>
-        </p:nvSpPr>
-        <p:spPr>
-          <a:xfrm>
-            <a:off x="8979158" y="3275044"/>
-            <a:ext cx="2569375" cy="2052735"/>
-          </a:xfrm>
-          <a:prstGeom prst="rect">
-            <a:avLst/>
-          </a:prstGeom>
-          <a:noFill/>
-          <a:ln w="50800">
-            <a:solidFill>
-              <a:schemeClr val="accent4">
-                <a:lumMod val="60000"/>
-                <a:lumOff val="40000"/>
-              </a:schemeClr>
-            </a:solidFill>
-            <a:prstDash val="sysDash"/>
-          </a:ln>
-        </p:spPr>
-        <p:style>
-          <a:lnRef idx="2">
-            <a:schemeClr val="accent1">
-              <a:shade val="50000"/>
-            </a:schemeClr>
-          </a:lnRef>
-          <a:fillRef idx="1">
-            <a:schemeClr val="accent1"/>
-          </a:fillRef>
-          <a:effectRef idx="0">
-            <a:schemeClr val="accent1"/>
-          </a:effectRef>
-          <a:fontRef idx="minor">
-            <a:schemeClr val="lt1"/>
-          </a:fontRef>
-        </p:style>
-        <p:txBody>
-          <a:bodyPr rtlCol="0" anchor="ctr"/>
-          <a:lstStyle/>
-          <a:p>
-            <a:pPr algn="ctr"/>
-            <a:endParaRPr lang="en-US">
-              <a:noFill/>
-            </a:endParaRPr>
-          </a:p>
-        </p:txBody>
-      </p:sp>
-      <p:sp>
-        <p:nvSpPr>
-          <p:cNvPr id="6" name="Rectangle 5">
-            <a:extLst>
-              <a:ext uri="{FF2B5EF4-FFF2-40B4-BE49-F238E27FC236}">
-                <a16:creationId xmlns:a16="http://schemas.microsoft.com/office/drawing/2014/main" id="{B130E81F-6AF0-44E3-A57D-BA16FAEBB6D6}"/>
-              </a:ext>
-            </a:extLst>
-          </p:cNvPr>
-          <p:cNvSpPr/>
-          <p:nvPr/>
-        </p:nvSpPr>
-        <p:spPr>
-          <a:xfrm>
-            <a:off x="5952931" y="1250302"/>
-            <a:ext cx="1959428" cy="1184988"/>
-          </a:xfrm>
-          <a:prstGeom prst="rect">
-            <a:avLst/>
-          </a:prstGeom>
-          <a:noFill/>
-          <a:ln w="50800">
-            <a:solidFill>
-              <a:schemeClr val="accent2"/>
-            </a:solidFill>
-            <a:prstDash val="sysDash"/>
-          </a:ln>
-        </p:spPr>
-        <p:style>
-          <a:lnRef idx="2">
-            <a:schemeClr val="accent1">
-              <a:shade val="50000"/>
-            </a:schemeClr>
-          </a:lnRef>
-          <a:fillRef idx="1">
-            <a:schemeClr val="accent1"/>
-          </a:fillRef>
-          <a:effectRef idx="0">
-            <a:schemeClr val="accent1"/>
-          </a:effectRef>
-          <a:fontRef idx="minor">
-            <a:schemeClr val="lt1"/>
-          </a:fontRef>
-        </p:style>
-        <p:txBody>
-          <a:bodyPr rtlCol="0" anchor="ctr"/>
-          <a:lstStyle/>
-          <a:p>
-            <a:pPr algn="ctr"/>
-            <a:endParaRPr lang="en-US">
-              <a:noFill/>
-            </a:endParaRPr>
-          </a:p>
-        </p:txBody>
-      </p:sp>
-    </p:spTree>
-    <p:extLst>
-      <p:ext uri="{BB962C8B-B14F-4D97-AF65-F5344CB8AC3E}">
-        <p14:creationId xmlns:p14="http://schemas.microsoft.com/office/powerpoint/2010/main" val="3214791025"/>
       </p:ext>
     </p:extLst>
   </p:cSld>
@@ -4764,10 +4749,10 @@
       </p:grpSpPr>
       <p:pic>
         <p:nvPicPr>
-          <p:cNvPr id="3" name="Picture 2" descr="Timeline&#10;&#10;Description automatically generated">
-            <a:extLst>
-              <a:ext uri="{FF2B5EF4-FFF2-40B4-BE49-F238E27FC236}">
-                <a16:creationId xmlns:a16="http://schemas.microsoft.com/office/drawing/2014/main" id="{C548E360-3F46-47D4-9155-5A9474A57175}"/>
+          <p:cNvPr id="3" name="Picture 2">
+            <a:extLst>
+              <a:ext uri="{FF2B5EF4-FFF2-40B4-BE49-F238E27FC236}">
+                <a16:creationId xmlns:a16="http://schemas.microsoft.com/office/drawing/2014/main" id="{0747A64E-D15C-43D0-B4C4-8A2644576285}"/>
               </a:ext>
             </a:extLst>
           </p:cNvPr>
@@ -4797,7 +4782,7 @@
           <p:cNvPr id="4" name="Rectangle 3">
             <a:extLst>
               <a:ext uri="{FF2B5EF4-FFF2-40B4-BE49-F238E27FC236}">
-                <a16:creationId xmlns:a16="http://schemas.microsoft.com/office/drawing/2014/main" id="{B7614658-E7BD-4F6E-A1CD-93C8160AE3FA}"/>
+                <a16:creationId xmlns:a16="http://schemas.microsoft.com/office/drawing/2014/main" id="{DECA4EA2-FA37-4B82-BC4E-439AC3591EC2}"/>
               </a:ext>
             </a:extLst>
           </p:cNvPr>
@@ -4806,8 +4791,8 @@
         </p:nvSpPr>
         <p:spPr>
           <a:xfrm>
-            <a:off x="6624735" y="4450702"/>
-            <a:ext cx="1959428" cy="1502229"/>
+            <a:off x="494522" y="3275044"/>
+            <a:ext cx="2186473" cy="2276669"/>
           </a:xfrm>
           <a:prstGeom prst="rect">
             <a:avLst/>
@@ -4815,7 +4800,10 @@
           <a:noFill/>
           <a:ln w="50800">
             <a:solidFill>
-              <a:schemeClr val="accent2"/>
+              <a:schemeClr val="accent4">
+                <a:lumMod val="60000"/>
+                <a:lumOff val="40000"/>
+              </a:schemeClr>
             </a:solidFill>
             <a:prstDash val="sysDash"/>
           </a:ln>
@@ -4849,10 +4837,10 @@
       </p:sp>
       <p:sp>
         <p:nvSpPr>
-          <p:cNvPr id="7" name="Rectangle 6">
-            <a:extLst>
-              <a:ext uri="{FF2B5EF4-FFF2-40B4-BE49-F238E27FC236}">
-                <a16:creationId xmlns:a16="http://schemas.microsoft.com/office/drawing/2014/main" id="{703F2FA3-600A-4360-A3C8-D958CC1D87F4}"/>
+          <p:cNvPr id="5" name="Rectangle 4">
+            <a:extLst>
+              <a:ext uri="{FF2B5EF4-FFF2-40B4-BE49-F238E27FC236}">
+                <a16:creationId xmlns:a16="http://schemas.microsoft.com/office/drawing/2014/main" id="{0103C118-605B-490C-A702-5694237C3EF9}"/>
               </a:ext>
             </a:extLst>
           </p:cNvPr>
@@ -4861,8 +4849,8 @@
         </p:nvSpPr>
         <p:spPr>
           <a:xfrm>
-            <a:off x="5984033" y="1278294"/>
-            <a:ext cx="1959428" cy="1129004"/>
+            <a:off x="8979158" y="3275044"/>
+            <a:ext cx="2569375" cy="2052735"/>
           </a:xfrm>
           <a:prstGeom prst="rect">
             <a:avLst/>
@@ -4905,6 +4893,242 @@
           </a:p>
         </p:txBody>
       </p:sp>
+      <p:sp>
+        <p:nvSpPr>
+          <p:cNvPr id="6" name="Rectangle 5">
+            <a:extLst>
+              <a:ext uri="{FF2B5EF4-FFF2-40B4-BE49-F238E27FC236}">
+                <a16:creationId xmlns:a16="http://schemas.microsoft.com/office/drawing/2014/main" id="{B130E81F-6AF0-44E3-A57D-BA16FAEBB6D6}"/>
+              </a:ext>
+            </a:extLst>
+          </p:cNvPr>
+          <p:cNvSpPr/>
+          <p:nvPr/>
+        </p:nvSpPr>
+        <p:spPr>
+          <a:xfrm>
+            <a:off x="5952931" y="1250302"/>
+            <a:ext cx="1959428" cy="1184988"/>
+          </a:xfrm>
+          <a:prstGeom prst="rect">
+            <a:avLst/>
+          </a:prstGeom>
+          <a:noFill/>
+          <a:ln w="50800">
+            <a:solidFill>
+              <a:schemeClr val="accent2"/>
+            </a:solidFill>
+            <a:prstDash val="sysDash"/>
+          </a:ln>
+        </p:spPr>
+        <p:style>
+          <a:lnRef idx="2">
+            <a:schemeClr val="accent1">
+              <a:shade val="50000"/>
+            </a:schemeClr>
+          </a:lnRef>
+          <a:fillRef idx="1">
+            <a:schemeClr val="accent1"/>
+          </a:fillRef>
+          <a:effectRef idx="0">
+            <a:schemeClr val="accent1"/>
+          </a:effectRef>
+          <a:fontRef idx="minor">
+            <a:schemeClr val="lt1"/>
+          </a:fontRef>
+        </p:style>
+        <p:txBody>
+          <a:bodyPr rtlCol="0" anchor="ctr"/>
+          <a:lstStyle/>
+          <a:p>
+            <a:pPr algn="ctr"/>
+            <a:endParaRPr lang="en-US">
+              <a:noFill/>
+            </a:endParaRPr>
+          </a:p>
+        </p:txBody>
+      </p:sp>
+    </p:spTree>
+    <p:extLst>
+      <p:ext uri="{BB962C8B-B14F-4D97-AF65-F5344CB8AC3E}">
+        <p14:creationId xmlns:p14="http://schemas.microsoft.com/office/powerpoint/2010/main" val="3214791025"/>
+      </p:ext>
+    </p:extLst>
+  </p:cSld>
+  <p:clrMapOvr>
+    <a:masterClrMapping/>
+  </p:clrMapOvr>
+</p:sld>
+</file>
+
+<file path=ppt/slides/slide8.xml><?xml version="1.0" encoding="utf-8"?>
+<p:sld xmlns:a="http://schemas.openxmlformats.org/drawingml/2006/main" xmlns:r="http://schemas.openxmlformats.org/officeDocument/2006/relationships" xmlns:p="http://schemas.openxmlformats.org/presentationml/2006/main">
+  <p:cSld>
+    <p:bg>
+      <p:bgPr>
+        <a:solidFill>
+          <a:schemeClr val="bg1"/>
+        </a:solidFill>
+        <a:effectLst/>
+      </p:bgPr>
+    </p:bg>
+    <p:spTree>
+      <p:nvGrpSpPr>
+        <p:cNvPr id="1" name=""/>
+        <p:cNvGrpSpPr/>
+        <p:nvPr/>
+      </p:nvGrpSpPr>
+      <p:grpSpPr>
+        <a:xfrm>
+          <a:off x="0" y="0"/>
+          <a:ext cx="0" cy="0"/>
+          <a:chOff x="0" y="0"/>
+          <a:chExt cx="0" cy="0"/>
+        </a:xfrm>
+      </p:grpSpPr>
+      <p:pic>
+        <p:nvPicPr>
+          <p:cNvPr id="3" name="Picture 2" descr="Timeline&#10;&#10;Description automatically generated">
+            <a:extLst>
+              <a:ext uri="{FF2B5EF4-FFF2-40B4-BE49-F238E27FC236}">
+                <a16:creationId xmlns:a16="http://schemas.microsoft.com/office/drawing/2014/main" id="{C548E360-3F46-47D4-9155-5A9474A57175}"/>
+              </a:ext>
+            </a:extLst>
+          </p:cNvPr>
+          <p:cNvPicPr>
+            <a:picLocks noChangeAspect="1"/>
+          </p:cNvPicPr>
+          <p:nvPr/>
+        </p:nvPicPr>
+        <p:blipFill>
+          <a:blip r:embed="rId2"/>
+          <a:stretch>
+            <a:fillRect/>
+          </a:stretch>
+        </p:blipFill>
+        <p:spPr>
+          <a:xfrm>
+            <a:off x="643467" y="1179830"/>
+            <a:ext cx="10905066" cy="4498338"/>
+          </a:xfrm>
+          <a:prstGeom prst="rect">
+            <a:avLst/>
+          </a:prstGeom>
+        </p:spPr>
+      </p:pic>
+      <p:sp>
+        <p:nvSpPr>
+          <p:cNvPr id="4" name="Rectangle 3">
+            <a:extLst>
+              <a:ext uri="{FF2B5EF4-FFF2-40B4-BE49-F238E27FC236}">
+                <a16:creationId xmlns:a16="http://schemas.microsoft.com/office/drawing/2014/main" id="{B7614658-E7BD-4F6E-A1CD-93C8160AE3FA}"/>
+              </a:ext>
+            </a:extLst>
+          </p:cNvPr>
+          <p:cNvSpPr/>
+          <p:nvPr/>
+        </p:nvSpPr>
+        <p:spPr>
+          <a:xfrm>
+            <a:off x="6624735" y="4450702"/>
+            <a:ext cx="1959428" cy="1502229"/>
+          </a:xfrm>
+          <a:prstGeom prst="rect">
+            <a:avLst/>
+          </a:prstGeom>
+          <a:noFill/>
+          <a:ln w="50800">
+            <a:solidFill>
+              <a:schemeClr val="accent2"/>
+            </a:solidFill>
+            <a:prstDash val="sysDash"/>
+          </a:ln>
+        </p:spPr>
+        <p:style>
+          <a:lnRef idx="2">
+            <a:schemeClr val="accent1">
+              <a:shade val="50000"/>
+            </a:schemeClr>
+          </a:lnRef>
+          <a:fillRef idx="1">
+            <a:schemeClr val="accent1"/>
+          </a:fillRef>
+          <a:effectRef idx="0">
+            <a:schemeClr val="accent1"/>
+          </a:effectRef>
+          <a:fontRef idx="minor">
+            <a:schemeClr val="lt1"/>
+          </a:fontRef>
+        </p:style>
+        <p:txBody>
+          <a:bodyPr rtlCol="0" anchor="ctr"/>
+          <a:lstStyle/>
+          <a:p>
+            <a:pPr algn="ctr"/>
+            <a:endParaRPr lang="en-US">
+              <a:noFill/>
+            </a:endParaRPr>
+          </a:p>
+        </p:txBody>
+      </p:sp>
+      <p:sp>
+        <p:nvSpPr>
+          <p:cNvPr id="7" name="Rectangle 6">
+            <a:extLst>
+              <a:ext uri="{FF2B5EF4-FFF2-40B4-BE49-F238E27FC236}">
+                <a16:creationId xmlns:a16="http://schemas.microsoft.com/office/drawing/2014/main" id="{703F2FA3-600A-4360-A3C8-D958CC1D87F4}"/>
+              </a:ext>
+            </a:extLst>
+          </p:cNvPr>
+          <p:cNvSpPr/>
+          <p:nvPr/>
+        </p:nvSpPr>
+        <p:spPr>
+          <a:xfrm>
+            <a:off x="5984033" y="1278294"/>
+            <a:ext cx="1959428" cy="1129004"/>
+          </a:xfrm>
+          <a:prstGeom prst="rect">
+            <a:avLst/>
+          </a:prstGeom>
+          <a:noFill/>
+          <a:ln w="50800">
+            <a:solidFill>
+              <a:schemeClr val="accent4">
+                <a:lumMod val="60000"/>
+                <a:lumOff val="40000"/>
+              </a:schemeClr>
+            </a:solidFill>
+            <a:prstDash val="sysDash"/>
+          </a:ln>
+        </p:spPr>
+        <p:style>
+          <a:lnRef idx="2">
+            <a:schemeClr val="accent1">
+              <a:shade val="50000"/>
+            </a:schemeClr>
+          </a:lnRef>
+          <a:fillRef idx="1">
+            <a:schemeClr val="accent1"/>
+          </a:fillRef>
+          <a:effectRef idx="0">
+            <a:schemeClr val="accent1"/>
+          </a:effectRef>
+          <a:fontRef idx="minor">
+            <a:schemeClr val="lt1"/>
+          </a:fontRef>
+        </p:style>
+        <p:txBody>
+          <a:bodyPr rtlCol="0" anchor="ctr"/>
+          <a:lstStyle/>
+          <a:p>
+            <a:pPr algn="ctr"/>
+            <a:endParaRPr lang="en-US">
+              <a:noFill/>
+            </a:endParaRPr>
+          </a:p>
+        </p:txBody>
+      </p:sp>
     </p:spTree>
     <p:extLst>
       <p:ext uri="{BB962C8B-B14F-4D97-AF65-F5344CB8AC3E}">
@@ -4918,7 +5142,7 @@
 </p:sld>
 </file>
 
-<file path=ppt/slides/slide8.xml><?xml version="1.0" encoding="utf-8"?>
+<file path=ppt/slides/slide9.xml><?xml version="1.0" encoding="utf-8"?>
 <p:sld xmlns:a="http://schemas.openxmlformats.org/drawingml/2006/main" xmlns:r="http://schemas.openxmlformats.org/officeDocument/2006/relationships" xmlns:p="http://schemas.openxmlformats.org/presentationml/2006/main">
   <p:cSld>
     <p:bg>

</xml_diff>